<commit_message>
making changes oh yeah
</commit_message>
<xml_diff>
--- a/slides/00-DailyAnnouncements.pptx
+++ b/slides/00-DailyAnnouncements.pptx
@@ -5,7 +5,7 @@
     <p:sldMasterId id="2147484006" r:id="rId1"/>
   </p:sldMasterIdLst>
   <p:notesMasterIdLst>
-    <p:notesMasterId r:id="rId15"/>
+    <p:notesMasterId r:id="rId16"/>
   </p:notesMasterIdLst>
   <p:sldIdLst>
     <p:sldId id="256" r:id="rId2"/>
@@ -21,6 +21,7 @@
     <p:sldId id="514" r:id="rId12"/>
     <p:sldId id="515" r:id="rId13"/>
     <p:sldId id="516" r:id="rId14"/>
+    <p:sldId id="517" r:id="rId15"/>
   </p:sldIdLst>
   <p:sldSz cx="12192000" cy="6858000"/>
   <p:notesSz cx="6858000" cy="9144000"/>
@@ -209,7 +210,7 @@
           <a:p>
             <a:fld id="{C5B45307-6ED4-B142-BD64-10F739779302}" type="datetimeFigureOut">
               <a:rPr lang="en-US" smtClean="0"/>
-              <a:t>3/19/25</a:t>
+              <a:t>3/24/25</a:t>
             </a:fld>
             <a:endParaRPr lang="en-US"/>
           </a:p>
@@ -617,7 +618,7 @@
           <a:noFill/>
           <a:extLst>
             <a:ext uri="{909E8E84-426E-40dd-AFC4-6F175D3DCCD1}">
-              <a14:hiddenFill xmlns:a14="http://schemas.microsoft.com/office/drawing/2010/main" xmlns="">
+              <a14:hiddenFill xmlns="" xmlns:a14="http://schemas.microsoft.com/office/drawing/2010/main">
                 <a:solidFill>
                   <a:srgbClr val="FFFFFF"/>
                 </a:solidFill>
@@ -676,7 +677,7 @@
             </a:ln>
             <a:extLst>
               <a:ext uri="{91240B29-F687-4f45-9708-019B960494DF}">
-                <a14:hiddenLine xmlns:a14="http://schemas.microsoft.com/office/drawing/2010/main" xmlns="" w="9525">
+                <a14:hiddenLine xmlns="" xmlns:a14="http://schemas.microsoft.com/office/drawing/2010/main" w="9525">
                   <a:solidFill>
                     <a:srgbClr val="000000"/>
                   </a:solidFill>
@@ -766,7 +767,7 @@
             </a:ln>
             <a:extLst>
               <a:ext uri="{91240B29-F687-4f45-9708-019B960494DF}">
-                <a14:hiddenLine xmlns:a14="http://schemas.microsoft.com/office/drawing/2010/main" xmlns="" w="9525">
+                <a14:hiddenLine xmlns="" xmlns:a14="http://schemas.microsoft.com/office/drawing/2010/main" w="9525">
                   <a:solidFill>
                     <a:srgbClr val="000000"/>
                   </a:solidFill>
@@ -856,7 +857,7 @@
             </a:ln>
             <a:extLst>
               <a:ext uri="{91240B29-F687-4f45-9708-019B960494DF}">
-                <a14:hiddenLine xmlns:a14="http://schemas.microsoft.com/office/drawing/2010/main" xmlns="" w="9525">
+                <a14:hiddenLine xmlns="" xmlns:a14="http://schemas.microsoft.com/office/drawing/2010/main" w="9525">
                   <a:solidFill>
                     <a:srgbClr val="000000"/>
                   </a:solidFill>
@@ -890,7 +891,7 @@
             </a:ln>
             <a:extLst>
               <a:ext uri="{91240B29-F687-4f45-9708-019B960494DF}">
-                <a14:hiddenLine xmlns:a14="http://schemas.microsoft.com/office/drawing/2010/main" xmlns="" w="9525">
+                <a14:hiddenLine xmlns="" xmlns:a14="http://schemas.microsoft.com/office/drawing/2010/main" w="9525">
                   <a:solidFill>
                     <a:srgbClr val="000000"/>
                   </a:solidFill>
@@ -980,7 +981,7 @@
             </a:ln>
             <a:extLst>
               <a:ext uri="{91240B29-F687-4f45-9708-019B960494DF}">
-                <a14:hiddenLine xmlns:a14="http://schemas.microsoft.com/office/drawing/2010/main" xmlns="" w="9525">
+                <a14:hiddenLine xmlns="" xmlns:a14="http://schemas.microsoft.com/office/drawing/2010/main" w="9525">
                   <a:solidFill>
                     <a:srgbClr val="000000"/>
                   </a:solidFill>
@@ -1042,7 +1043,7 @@
             </a:ln>
             <a:extLst>
               <a:ext uri="{91240B29-F687-4f45-9708-019B960494DF}">
-                <a14:hiddenLine xmlns:a14="http://schemas.microsoft.com/office/drawing/2010/main" xmlns="" w="9525">
+                <a14:hiddenLine xmlns="" xmlns:a14="http://schemas.microsoft.com/office/drawing/2010/main" w="9525">
                   <a:solidFill>
                     <a:srgbClr val="000000"/>
                   </a:solidFill>
@@ -1104,7 +1105,7 @@
             </a:ln>
             <a:extLst>
               <a:ext uri="{91240B29-F687-4f45-9708-019B960494DF}">
-                <a14:hiddenLine xmlns:a14="http://schemas.microsoft.com/office/drawing/2010/main" xmlns="" w="9525">
+                <a14:hiddenLine xmlns="" xmlns:a14="http://schemas.microsoft.com/office/drawing/2010/main" w="9525">
                   <a:solidFill>
                     <a:srgbClr val="000000"/>
                   </a:solidFill>
@@ -1194,7 +1195,7 @@
             </a:ln>
             <a:extLst>
               <a:ext uri="{91240B29-F687-4f45-9708-019B960494DF}">
-                <a14:hiddenLine xmlns:a14="http://schemas.microsoft.com/office/drawing/2010/main" xmlns="" w="9525">
+                <a14:hiddenLine xmlns="" xmlns:a14="http://schemas.microsoft.com/office/drawing/2010/main" w="9525">
                   <a:solidFill>
                     <a:srgbClr val="000000"/>
                   </a:solidFill>
@@ -1256,7 +1257,7 @@
             </a:ln>
             <a:extLst>
               <a:ext uri="{91240B29-F687-4f45-9708-019B960494DF}">
-                <a14:hiddenLine xmlns:a14="http://schemas.microsoft.com/office/drawing/2010/main" xmlns="" w="9525">
+                <a14:hiddenLine xmlns="" xmlns:a14="http://schemas.microsoft.com/office/drawing/2010/main" w="9525">
                   <a:solidFill>
                     <a:srgbClr val="000000"/>
                   </a:solidFill>
@@ -1318,7 +1319,7 @@
             </a:ln>
             <a:extLst>
               <a:ext uri="{91240B29-F687-4f45-9708-019B960494DF}">
-                <a14:hiddenLine xmlns:a14="http://schemas.microsoft.com/office/drawing/2010/main" xmlns="" w="9525">
+                <a14:hiddenLine xmlns="" xmlns:a14="http://schemas.microsoft.com/office/drawing/2010/main" w="9525">
                   <a:solidFill>
                     <a:srgbClr val="000000"/>
                   </a:solidFill>
@@ -1408,7 +1409,7 @@
             </a:ln>
             <a:extLst>
               <a:ext uri="{91240B29-F687-4f45-9708-019B960494DF}">
-                <a14:hiddenLine xmlns:a14="http://schemas.microsoft.com/office/drawing/2010/main" xmlns="" w="9525">
+                <a14:hiddenLine xmlns="" xmlns:a14="http://schemas.microsoft.com/office/drawing/2010/main" w="9525">
                   <a:solidFill>
                     <a:srgbClr val="000000"/>
                   </a:solidFill>
@@ -1498,7 +1499,7 @@
             </a:ln>
             <a:extLst>
               <a:ext uri="{91240B29-F687-4f45-9708-019B960494DF}">
-                <a14:hiddenLine xmlns:a14="http://schemas.microsoft.com/office/drawing/2010/main" xmlns="" w="9525">
+                <a14:hiddenLine xmlns="" xmlns:a14="http://schemas.microsoft.com/office/drawing/2010/main" w="9525">
                   <a:solidFill>
                     <a:srgbClr val="000000"/>
                   </a:solidFill>
@@ -1560,7 +1561,7 @@
             </a:ln>
             <a:extLst>
               <a:ext uri="{91240B29-F687-4f45-9708-019B960494DF}">
-                <a14:hiddenLine xmlns:a14="http://schemas.microsoft.com/office/drawing/2010/main" xmlns="" w="9525">
+                <a14:hiddenLine xmlns="" xmlns:a14="http://schemas.microsoft.com/office/drawing/2010/main" w="9525">
                   <a:solidFill>
                     <a:srgbClr val="000000"/>
                   </a:solidFill>
@@ -1670,7 +1671,7 @@
             </a:ln>
             <a:extLst>
               <a:ext uri="{91240B29-F687-4f45-9708-019B960494DF}">
-                <a14:hiddenLine xmlns:a14="http://schemas.microsoft.com/office/drawing/2010/main" xmlns="" w="9525">
+                <a14:hiddenLine xmlns="" xmlns:a14="http://schemas.microsoft.com/office/drawing/2010/main" w="9525">
                   <a:solidFill>
                     <a:srgbClr val="000000"/>
                   </a:solidFill>
@@ -1732,7 +1733,7 @@
             </a:ln>
             <a:extLst>
               <a:ext uri="{91240B29-F687-4f45-9708-019B960494DF}">
-                <a14:hiddenLine xmlns:a14="http://schemas.microsoft.com/office/drawing/2010/main" xmlns="" w="9525">
+                <a14:hiddenLine xmlns="" xmlns:a14="http://schemas.microsoft.com/office/drawing/2010/main" w="9525">
                   <a:solidFill>
                     <a:srgbClr val="000000"/>
                   </a:solidFill>
@@ -1822,7 +1823,7 @@
             </a:ln>
             <a:extLst>
               <a:ext uri="{91240B29-F687-4f45-9708-019B960494DF}">
-                <a14:hiddenLine xmlns:a14="http://schemas.microsoft.com/office/drawing/2010/main" xmlns="" w="9525">
+                <a14:hiddenLine xmlns="" xmlns:a14="http://schemas.microsoft.com/office/drawing/2010/main" w="9525">
                   <a:solidFill>
                     <a:srgbClr val="000000"/>
                   </a:solidFill>
@@ -1912,7 +1913,7 @@
             </a:ln>
             <a:extLst>
               <a:ext uri="{91240B29-F687-4f45-9708-019B960494DF}">
-                <a14:hiddenLine xmlns:a14="http://schemas.microsoft.com/office/drawing/2010/main" xmlns="" w="9525">
+                <a14:hiddenLine xmlns="" xmlns:a14="http://schemas.microsoft.com/office/drawing/2010/main" w="9525">
                   <a:solidFill>
                     <a:srgbClr val="000000"/>
                   </a:solidFill>
@@ -1974,7 +1975,7 @@
             </a:ln>
             <a:extLst>
               <a:ext uri="{91240B29-F687-4f45-9708-019B960494DF}">
-                <a14:hiddenLine xmlns:a14="http://schemas.microsoft.com/office/drawing/2010/main" xmlns="" w="9525">
+                <a14:hiddenLine xmlns="" xmlns:a14="http://schemas.microsoft.com/office/drawing/2010/main" w="9525">
                   <a:solidFill>
                     <a:srgbClr val="000000"/>
                   </a:solidFill>
@@ -2064,7 +2065,7 @@
             </a:ln>
             <a:extLst>
               <a:ext uri="{91240B29-F687-4f45-9708-019B960494DF}">
-                <a14:hiddenLine xmlns:a14="http://schemas.microsoft.com/office/drawing/2010/main" xmlns="" w="9525">
+                <a14:hiddenLine xmlns="" xmlns:a14="http://schemas.microsoft.com/office/drawing/2010/main" w="9525">
                   <a:solidFill>
                     <a:srgbClr val="000000"/>
                   </a:solidFill>
@@ -2154,7 +2155,7 @@
             </a:ln>
             <a:extLst>
               <a:ext uri="{91240B29-F687-4f45-9708-019B960494DF}">
-                <a14:hiddenLine xmlns:a14="http://schemas.microsoft.com/office/drawing/2010/main" xmlns="" w="9525">
+                <a14:hiddenLine xmlns="" xmlns:a14="http://schemas.microsoft.com/office/drawing/2010/main" w="9525">
                   <a:solidFill>
                     <a:srgbClr val="000000"/>
                   </a:solidFill>
@@ -2210,7 +2211,7 @@
             </a:ln>
             <a:extLst>
               <a:ext uri="{91240B29-F687-4f45-9708-019B960494DF}">
-                <a14:hiddenLine xmlns:a14="http://schemas.microsoft.com/office/drawing/2010/main" xmlns="" w="9525">
+                <a14:hiddenLine xmlns="" xmlns:a14="http://schemas.microsoft.com/office/drawing/2010/main" w="9525">
                   <a:solidFill>
                     <a:srgbClr val="000000"/>
                   </a:solidFill>
@@ -2300,7 +2301,7 @@
             </a:ln>
             <a:extLst>
               <a:ext uri="{91240B29-F687-4f45-9708-019B960494DF}">
-                <a14:hiddenLine xmlns:a14="http://schemas.microsoft.com/office/drawing/2010/main" xmlns="" w="9525">
+                <a14:hiddenLine xmlns="" xmlns:a14="http://schemas.microsoft.com/office/drawing/2010/main" w="9525">
                   <a:solidFill>
                     <a:srgbClr val="000000"/>
                   </a:solidFill>
@@ -2356,7 +2357,7 @@
             </a:ln>
             <a:extLst>
               <a:ext uri="{91240B29-F687-4f45-9708-019B960494DF}">
-                <a14:hiddenLine xmlns:a14="http://schemas.microsoft.com/office/drawing/2010/main" xmlns="" w="9525">
+                <a14:hiddenLine xmlns="" xmlns:a14="http://schemas.microsoft.com/office/drawing/2010/main" w="9525">
                   <a:solidFill>
                     <a:srgbClr val="000000"/>
                   </a:solidFill>
@@ -2446,7 +2447,7 @@
             </a:ln>
             <a:extLst>
               <a:ext uri="{91240B29-F687-4f45-9708-019B960494DF}">
-                <a14:hiddenLine xmlns:a14="http://schemas.microsoft.com/office/drawing/2010/main" xmlns="" w="9525">
+                <a14:hiddenLine xmlns="" xmlns:a14="http://schemas.microsoft.com/office/drawing/2010/main" w="9525">
                   <a:solidFill>
                     <a:srgbClr val="000000"/>
                   </a:solidFill>
@@ -2514,7 +2515,7 @@
             </a:ln>
             <a:extLst>
               <a:ext uri="{91240B29-F687-4f45-9708-019B960494DF}">
-                <a14:hiddenLine xmlns:a14="http://schemas.microsoft.com/office/drawing/2010/main" xmlns="" w="9525">
+                <a14:hiddenLine xmlns="" xmlns:a14="http://schemas.microsoft.com/office/drawing/2010/main" w="9525">
                   <a:solidFill>
                     <a:srgbClr val="000000"/>
                   </a:solidFill>
@@ -2604,7 +2605,7 @@
             </a:ln>
             <a:extLst>
               <a:ext uri="{91240B29-F687-4f45-9708-019B960494DF}">
-                <a14:hiddenLine xmlns:a14="http://schemas.microsoft.com/office/drawing/2010/main" xmlns="" w="9525">
+                <a14:hiddenLine xmlns="" xmlns:a14="http://schemas.microsoft.com/office/drawing/2010/main" w="9525">
                   <a:solidFill>
                     <a:srgbClr val="000000"/>
                   </a:solidFill>
@@ -2672,7 +2673,7 @@
             </a:ln>
             <a:extLst>
               <a:ext uri="{91240B29-F687-4f45-9708-019B960494DF}">
-                <a14:hiddenLine xmlns:a14="http://schemas.microsoft.com/office/drawing/2010/main" xmlns="" w="9525">
+                <a14:hiddenLine xmlns="" xmlns:a14="http://schemas.microsoft.com/office/drawing/2010/main" w="9525">
                   <a:solidFill>
                     <a:srgbClr val="000000"/>
                   </a:solidFill>
@@ -2762,7 +2763,7 @@
             </a:ln>
             <a:extLst>
               <a:ext uri="{91240B29-F687-4f45-9708-019B960494DF}">
-                <a14:hiddenLine xmlns:a14="http://schemas.microsoft.com/office/drawing/2010/main" xmlns="" w="9525">
+                <a14:hiddenLine xmlns="" xmlns:a14="http://schemas.microsoft.com/office/drawing/2010/main" w="9525">
                   <a:solidFill>
                     <a:srgbClr val="000000"/>
                   </a:solidFill>
@@ -2796,7 +2797,7 @@
             </a:ln>
             <a:extLst>
               <a:ext uri="{91240B29-F687-4f45-9708-019B960494DF}">
-                <a14:hiddenLine xmlns:a14="http://schemas.microsoft.com/office/drawing/2010/main" xmlns="" w="9525">
+                <a14:hiddenLine xmlns="" xmlns:a14="http://schemas.microsoft.com/office/drawing/2010/main" w="9525">
                   <a:solidFill>
                     <a:srgbClr val="000000"/>
                   </a:solidFill>
@@ -2886,7 +2887,7 @@
             </a:ln>
             <a:extLst>
               <a:ext uri="{91240B29-F687-4f45-9708-019B960494DF}">
-                <a14:hiddenLine xmlns:a14="http://schemas.microsoft.com/office/drawing/2010/main" xmlns="" w="9525">
+                <a14:hiddenLine xmlns="" xmlns:a14="http://schemas.microsoft.com/office/drawing/2010/main" w="9525">
                   <a:solidFill>
                     <a:srgbClr val="000000"/>
                   </a:solidFill>
@@ -2948,7 +2949,7 @@
             </a:ln>
             <a:extLst>
               <a:ext uri="{91240B29-F687-4f45-9708-019B960494DF}">
-                <a14:hiddenLine xmlns:a14="http://schemas.microsoft.com/office/drawing/2010/main" xmlns="" w="9525">
+                <a14:hiddenLine xmlns="" xmlns:a14="http://schemas.microsoft.com/office/drawing/2010/main" w="9525">
                   <a:solidFill>
                     <a:srgbClr val="000000"/>
                   </a:solidFill>
@@ -3010,7 +3011,7 @@
             </a:ln>
             <a:extLst>
               <a:ext uri="{91240B29-F687-4f45-9708-019B960494DF}">
-                <a14:hiddenLine xmlns:a14="http://schemas.microsoft.com/office/drawing/2010/main" xmlns="" w="9525">
+                <a14:hiddenLine xmlns="" xmlns:a14="http://schemas.microsoft.com/office/drawing/2010/main" w="9525">
                   <a:solidFill>
                     <a:srgbClr val="000000"/>
                   </a:solidFill>
@@ -3100,7 +3101,7 @@
             </a:ln>
             <a:extLst>
               <a:ext uri="{91240B29-F687-4f45-9708-019B960494DF}">
-                <a14:hiddenLine xmlns:a14="http://schemas.microsoft.com/office/drawing/2010/main" xmlns="" w="9525">
+                <a14:hiddenLine xmlns="" xmlns:a14="http://schemas.microsoft.com/office/drawing/2010/main" w="9525">
                   <a:solidFill>
                     <a:srgbClr val="000000"/>
                   </a:solidFill>
@@ -3168,7 +3169,7 @@
             </a:ln>
             <a:extLst>
               <a:ext uri="{91240B29-F687-4f45-9708-019B960494DF}">
-                <a14:hiddenLine xmlns:a14="http://schemas.microsoft.com/office/drawing/2010/main" xmlns="" w="9525">
+                <a14:hiddenLine xmlns="" xmlns:a14="http://schemas.microsoft.com/office/drawing/2010/main" w="9525">
                   <a:solidFill>
                     <a:srgbClr val="000000"/>
                   </a:solidFill>
@@ -3230,7 +3231,7 @@
             </a:ln>
             <a:extLst>
               <a:ext uri="{91240B29-F687-4f45-9708-019B960494DF}">
-                <a14:hiddenLine xmlns:a14="http://schemas.microsoft.com/office/drawing/2010/main" xmlns="" w="9525">
+                <a14:hiddenLine xmlns="" xmlns:a14="http://schemas.microsoft.com/office/drawing/2010/main" w="9525">
                   <a:solidFill>
                     <a:srgbClr val="000000"/>
                   </a:solidFill>
@@ -3320,7 +3321,7 @@
             </a:ln>
             <a:extLst>
               <a:ext uri="{91240B29-F687-4f45-9708-019B960494DF}">
-                <a14:hiddenLine xmlns:a14="http://schemas.microsoft.com/office/drawing/2010/main" xmlns="" w="9525">
+                <a14:hiddenLine xmlns="" xmlns:a14="http://schemas.microsoft.com/office/drawing/2010/main" w="9525">
                   <a:solidFill>
                     <a:srgbClr val="000000"/>
                   </a:solidFill>
@@ -3382,7 +3383,7 @@
             </a:ln>
             <a:extLst>
               <a:ext uri="{91240B29-F687-4f45-9708-019B960494DF}">
-                <a14:hiddenLine xmlns:a14="http://schemas.microsoft.com/office/drawing/2010/main" xmlns="" w="9525">
+                <a14:hiddenLine xmlns="" xmlns:a14="http://schemas.microsoft.com/office/drawing/2010/main" w="9525">
                   <a:solidFill>
                     <a:srgbClr val="000000"/>
                   </a:solidFill>
@@ -3472,7 +3473,7 @@
             </a:ln>
             <a:extLst>
               <a:ext uri="{91240B29-F687-4f45-9708-019B960494DF}">
-                <a14:hiddenLine xmlns:a14="http://schemas.microsoft.com/office/drawing/2010/main" xmlns="" w="9525">
+                <a14:hiddenLine xmlns="" xmlns:a14="http://schemas.microsoft.com/office/drawing/2010/main" w="9525">
                   <a:solidFill>
                     <a:srgbClr val="000000"/>
                   </a:solidFill>
@@ -3534,7 +3535,7 @@
             </a:ln>
             <a:extLst>
               <a:ext uri="{91240B29-F687-4f45-9708-019B960494DF}">
-                <a14:hiddenLine xmlns:a14="http://schemas.microsoft.com/office/drawing/2010/main" xmlns="" w="9525">
+                <a14:hiddenLine xmlns="" xmlns:a14="http://schemas.microsoft.com/office/drawing/2010/main" w="9525">
                   <a:solidFill>
                     <a:srgbClr val="000000"/>
                   </a:solidFill>
@@ -3624,7 +3625,7 @@
             </a:ln>
             <a:extLst>
               <a:ext uri="{91240B29-F687-4f45-9708-019B960494DF}">
-                <a14:hiddenLine xmlns:a14="http://schemas.microsoft.com/office/drawing/2010/main" xmlns="" w="9525">
+                <a14:hiddenLine xmlns="" xmlns:a14="http://schemas.microsoft.com/office/drawing/2010/main" w="9525">
                   <a:solidFill>
                     <a:srgbClr val="000000"/>
                   </a:solidFill>
@@ -3658,7 +3659,7 @@
             </a:ln>
             <a:extLst>
               <a:ext uri="{91240B29-F687-4f45-9708-019B960494DF}">
-                <a14:hiddenLine xmlns:a14="http://schemas.microsoft.com/office/drawing/2010/main" xmlns="" w="9525">
+                <a14:hiddenLine xmlns="" xmlns:a14="http://schemas.microsoft.com/office/drawing/2010/main" w="9525">
                   <a:solidFill>
                     <a:srgbClr val="000000"/>
                   </a:solidFill>
@@ -3723,7 +3724,7 @@
             </a:ln>
             <a:extLst>
               <a:ext uri="{91240B29-F687-4f45-9708-019B960494DF}">
-                <a14:hiddenLine xmlns:a14="http://schemas.microsoft.com/office/drawing/2010/main" xmlns="" w="9525">
+                <a14:hiddenLine xmlns="" xmlns:a14="http://schemas.microsoft.com/office/drawing/2010/main" w="9525">
                   <a:solidFill>
                     <a:srgbClr val="000000"/>
                   </a:solidFill>
@@ -3813,7 +3814,7 @@
             </a:ln>
             <a:extLst>
               <a:ext uri="{91240B29-F687-4f45-9708-019B960494DF}">
-                <a14:hiddenLine xmlns:a14="http://schemas.microsoft.com/office/drawing/2010/main" xmlns="" w="9525">
+                <a14:hiddenLine xmlns="" xmlns:a14="http://schemas.microsoft.com/office/drawing/2010/main" w="9525">
                   <a:solidFill>
                     <a:srgbClr val="000000"/>
                   </a:solidFill>
@@ -3875,7 +3876,7 @@
             </a:ln>
             <a:extLst>
               <a:ext uri="{91240B29-F687-4f45-9708-019B960494DF}">
-                <a14:hiddenLine xmlns:a14="http://schemas.microsoft.com/office/drawing/2010/main" xmlns="" w="9525">
+                <a14:hiddenLine xmlns="" xmlns:a14="http://schemas.microsoft.com/office/drawing/2010/main" w="9525">
                   <a:solidFill>
                     <a:srgbClr val="000000"/>
                   </a:solidFill>
@@ -3965,7 +3966,7 @@
             </a:ln>
             <a:extLst>
               <a:ext uri="{91240B29-F687-4f45-9708-019B960494DF}">
-                <a14:hiddenLine xmlns:a14="http://schemas.microsoft.com/office/drawing/2010/main" xmlns="" w="9525">
+                <a14:hiddenLine xmlns="" xmlns:a14="http://schemas.microsoft.com/office/drawing/2010/main" w="9525">
                   <a:solidFill>
                     <a:srgbClr val="000000"/>
                   </a:solidFill>
@@ -4055,7 +4056,7 @@
             </a:ln>
             <a:extLst>
               <a:ext uri="{91240B29-F687-4f45-9708-019B960494DF}">
-                <a14:hiddenLine xmlns:a14="http://schemas.microsoft.com/office/drawing/2010/main" xmlns="" w="9525">
+                <a14:hiddenLine xmlns="" xmlns:a14="http://schemas.microsoft.com/office/drawing/2010/main" w="9525">
                   <a:solidFill>
                     <a:srgbClr val="000000"/>
                   </a:solidFill>
@@ -4120,7 +4121,7 @@
             </a:ln>
             <a:extLst>
               <a:ext uri="{91240B29-F687-4f45-9708-019B960494DF}">
-                <a14:hiddenLine xmlns:a14="http://schemas.microsoft.com/office/drawing/2010/main" xmlns="" w="9525">
+                <a14:hiddenLine xmlns="" xmlns:a14="http://schemas.microsoft.com/office/drawing/2010/main" w="9525">
                   <a:solidFill>
                     <a:srgbClr val="000000"/>
                   </a:solidFill>
@@ -4182,7 +4183,7 @@
             </a:ln>
             <a:extLst>
               <a:ext uri="{91240B29-F687-4f45-9708-019B960494DF}">
-                <a14:hiddenLine xmlns:a14="http://schemas.microsoft.com/office/drawing/2010/main" xmlns="" w="9525">
+                <a14:hiddenLine xmlns="" xmlns:a14="http://schemas.microsoft.com/office/drawing/2010/main" w="9525">
                   <a:solidFill>
                     <a:srgbClr val="000000"/>
                   </a:solidFill>
@@ -4272,7 +4273,7 @@
             </a:ln>
             <a:extLst>
               <a:ext uri="{91240B29-F687-4f45-9708-019B960494DF}">
-                <a14:hiddenLine xmlns:a14="http://schemas.microsoft.com/office/drawing/2010/main" xmlns="" w="9525">
+                <a14:hiddenLine xmlns="" xmlns:a14="http://schemas.microsoft.com/office/drawing/2010/main" w="9525">
                   <a:solidFill>
                     <a:srgbClr val="000000"/>
                   </a:solidFill>
@@ -4362,7 +4363,7 @@
             </a:ln>
             <a:extLst>
               <a:ext uri="{91240B29-F687-4f45-9708-019B960494DF}">
-                <a14:hiddenLine xmlns:a14="http://schemas.microsoft.com/office/drawing/2010/main" xmlns="" w="9525">
+                <a14:hiddenLine xmlns="" xmlns:a14="http://schemas.microsoft.com/office/drawing/2010/main" w="9525">
                   <a:solidFill>
                     <a:srgbClr val="000000"/>
                   </a:solidFill>
@@ -4424,7 +4425,7 @@
             </a:ln>
             <a:extLst>
               <a:ext uri="{91240B29-F687-4f45-9708-019B960494DF}">
-                <a14:hiddenLine xmlns:a14="http://schemas.microsoft.com/office/drawing/2010/main" xmlns="" w="9525">
+                <a14:hiddenLine xmlns="" xmlns:a14="http://schemas.microsoft.com/office/drawing/2010/main" w="9525">
                   <a:solidFill>
                     <a:srgbClr val="000000"/>
                   </a:solidFill>
@@ -4544,7 +4545,7 @@
             </a:ln>
             <a:extLst>
               <a:ext uri="{91240B29-F687-4f45-9708-019B960494DF}">
-                <a14:hiddenLine xmlns:a14="http://schemas.microsoft.com/office/drawing/2010/main" xmlns="" w="9525">
+                <a14:hiddenLine xmlns="" xmlns:a14="http://schemas.microsoft.com/office/drawing/2010/main" w="9525">
                   <a:solidFill>
                     <a:srgbClr val="000000"/>
                   </a:solidFill>
@@ -4612,7 +4613,7 @@
             </a:ln>
             <a:extLst>
               <a:ext uri="{91240B29-F687-4f45-9708-019B960494DF}">
-                <a14:hiddenLine xmlns:a14="http://schemas.microsoft.com/office/drawing/2010/main" xmlns="" w="9525">
+                <a14:hiddenLine xmlns="" xmlns:a14="http://schemas.microsoft.com/office/drawing/2010/main" w="9525">
                   <a:solidFill>
                     <a:srgbClr val="000000"/>
                   </a:solidFill>
@@ -4702,7 +4703,7 @@
             </a:ln>
             <a:extLst>
               <a:ext uri="{91240B29-F687-4f45-9708-019B960494DF}">
-                <a14:hiddenLine xmlns:a14="http://schemas.microsoft.com/office/drawing/2010/main" xmlns="" w="9525">
+                <a14:hiddenLine xmlns="" xmlns:a14="http://schemas.microsoft.com/office/drawing/2010/main" w="9525">
                   <a:solidFill>
                     <a:srgbClr val="000000"/>
                   </a:solidFill>
@@ -4842,7 +4843,7 @@
           <a:p>
             <a:fld id="{EC4347D3-4C9A-C240-8F14-750059DFEEB0}" type="datetimeFigureOut">
               <a:rPr lang="en-US" smtClean="0"/>
-              <a:t>3/19/25</a:t>
+              <a:t>3/24/25</a:t>
             </a:fld>
             <a:endParaRPr lang="en-US"/>
           </a:p>
@@ -5109,7 +5110,7 @@
           <a:p>
             <a:fld id="{EC4347D3-4C9A-C240-8F14-750059DFEEB0}" type="datetimeFigureOut">
               <a:rPr lang="en-US" smtClean="0"/>
-              <a:t>3/19/25</a:t>
+              <a:t>3/24/25</a:t>
             </a:fld>
             <a:endParaRPr lang="en-US"/>
           </a:p>
@@ -5305,7 +5306,7 @@
           <a:p>
             <a:fld id="{EC4347D3-4C9A-C240-8F14-750059DFEEB0}" type="datetimeFigureOut">
               <a:rPr lang="en-US" smtClean="0"/>
-              <a:t>3/19/25</a:t>
+              <a:t>3/24/25</a:t>
             </a:fld>
             <a:endParaRPr lang="en-US"/>
           </a:p>
@@ -5568,7 +5569,7 @@
           <a:p>
             <a:fld id="{EC4347D3-4C9A-C240-8F14-750059DFEEB0}" type="datetimeFigureOut">
               <a:rPr lang="en-US" smtClean="0"/>
-              <a:t>3/19/25</a:t>
+              <a:t>3/24/25</a:t>
             </a:fld>
             <a:endParaRPr lang="en-US"/>
           </a:p>
@@ -6002,7 +6003,7 @@
           <a:p>
             <a:fld id="{EC4347D3-4C9A-C240-8F14-750059DFEEB0}" type="datetimeFigureOut">
               <a:rPr lang="en-US" smtClean="0"/>
-              <a:t>3/19/25</a:t>
+              <a:t>3/24/25</a:t>
             </a:fld>
             <a:endParaRPr lang="en-US"/>
           </a:p>
@@ -6548,7 +6549,7 @@
           <a:p>
             <a:fld id="{EC4347D3-4C9A-C240-8F14-750059DFEEB0}" type="datetimeFigureOut">
               <a:rPr lang="en-US" smtClean="0"/>
-              <a:t>3/19/25</a:t>
+              <a:t>3/24/25</a:t>
             </a:fld>
             <a:endParaRPr lang="en-US"/>
           </a:p>
@@ -7268,7 +7269,7 @@
           <a:p>
             <a:fld id="{EC4347D3-4C9A-C240-8F14-750059DFEEB0}" type="datetimeFigureOut">
               <a:rPr lang="en-US" smtClean="0"/>
-              <a:t>3/19/25</a:t>
+              <a:t>3/24/25</a:t>
             </a:fld>
             <a:endParaRPr lang="en-US"/>
           </a:p>
@@ -7438,7 +7439,7 @@
           <a:p>
             <a:fld id="{EC4347D3-4C9A-C240-8F14-750059DFEEB0}" type="datetimeFigureOut">
               <a:rPr lang="en-US" smtClean="0"/>
-              <a:t>3/19/25</a:t>
+              <a:t>3/24/25</a:t>
             </a:fld>
             <a:endParaRPr lang="en-US"/>
           </a:p>
@@ -7618,7 +7619,7 @@
           <a:p>
             <a:fld id="{EC4347D3-4C9A-C240-8F14-750059DFEEB0}" type="datetimeFigureOut">
               <a:rPr lang="en-US" smtClean="0"/>
-              <a:t>3/19/25</a:t>
+              <a:t>3/24/25</a:t>
             </a:fld>
             <a:endParaRPr lang="en-US"/>
           </a:p>
@@ -7788,7 +7789,7 @@
           <a:p>
             <a:fld id="{EC4347D3-4C9A-C240-8F14-750059DFEEB0}" type="datetimeFigureOut">
               <a:rPr lang="en-US" smtClean="0"/>
-              <a:t>3/19/25</a:t>
+              <a:t>3/24/25</a:t>
             </a:fld>
             <a:endParaRPr lang="en-US"/>
           </a:p>
@@ -8038,7 +8039,7 @@
           <a:p>
             <a:fld id="{EC4347D3-4C9A-C240-8F14-750059DFEEB0}" type="datetimeFigureOut">
               <a:rPr lang="en-US" smtClean="0"/>
-              <a:t>3/19/25</a:t>
+              <a:t>3/24/25</a:t>
             </a:fld>
             <a:endParaRPr lang="en-US"/>
           </a:p>
@@ -8270,7 +8271,7 @@
           <a:p>
             <a:fld id="{EC4347D3-4C9A-C240-8F14-750059DFEEB0}" type="datetimeFigureOut">
               <a:rPr lang="en-US" smtClean="0"/>
-              <a:t>3/19/25</a:t>
+              <a:t>3/24/25</a:t>
             </a:fld>
             <a:endParaRPr lang="en-US"/>
           </a:p>
@@ -8656,7 +8657,7 @@
           <a:p>
             <a:fld id="{EC4347D3-4C9A-C240-8F14-750059DFEEB0}" type="datetimeFigureOut">
               <a:rPr lang="en-US" smtClean="0"/>
-              <a:t>3/19/25</a:t>
+              <a:t>3/24/25</a:t>
             </a:fld>
             <a:endParaRPr lang="en-US"/>
           </a:p>
@@ -8779,7 +8780,7 @@
           <a:p>
             <a:fld id="{EC4347D3-4C9A-C240-8F14-750059DFEEB0}" type="datetimeFigureOut">
               <a:rPr lang="en-US" smtClean="0"/>
-              <a:t>3/19/25</a:t>
+              <a:t>3/24/25</a:t>
             </a:fld>
             <a:endParaRPr lang="en-US"/>
           </a:p>
@@ -8874,7 +8875,7 @@
           <a:p>
             <a:fld id="{EC4347D3-4C9A-C240-8F14-750059DFEEB0}" type="datetimeFigureOut">
               <a:rPr lang="en-US" smtClean="0"/>
-              <a:t>3/19/25</a:t>
+              <a:t>3/24/25</a:t>
             </a:fld>
             <a:endParaRPr lang="en-US"/>
           </a:p>
@@ -9123,7 +9124,7 @@
           <a:p>
             <a:fld id="{EC4347D3-4C9A-C240-8F14-750059DFEEB0}" type="datetimeFigureOut">
               <a:rPr lang="en-US" smtClean="0"/>
-              <a:t>3/19/25</a:t>
+              <a:t>3/24/25</a:t>
             </a:fld>
             <a:endParaRPr lang="en-US"/>
           </a:p>
@@ -9408,7 +9409,7 @@
           <a:p>
             <a:fld id="{EC4347D3-4C9A-C240-8F14-750059DFEEB0}" type="datetimeFigureOut">
               <a:rPr lang="en-US" smtClean="0"/>
-              <a:t>3/19/25</a:t>
+              <a:t>3/24/25</a:t>
             </a:fld>
             <a:endParaRPr lang="en-US"/>
           </a:p>
@@ -9531,7 +9532,7 @@
           <a:noFill/>
           <a:extLst>
             <a:ext uri="{909E8E84-426E-40dd-AFC4-6F175D3DCCD1}">
-              <a14:hiddenFill xmlns:a14="http://schemas.microsoft.com/office/drawing/2010/main" xmlns="">
+              <a14:hiddenFill xmlns="" xmlns:a14="http://schemas.microsoft.com/office/drawing/2010/main">
                 <a:solidFill>
                   <a:srgbClr val="FFFFFF"/>
                 </a:solidFill>
@@ -9605,7 +9606,7 @@
               </a:ln>
               <a:extLst>
                 <a:ext uri="{91240B29-F687-4f45-9708-019B960494DF}">
-                  <a14:hiddenLine xmlns:a14="http://schemas.microsoft.com/office/drawing/2010/main" xmlns="" w="9525">
+                  <a14:hiddenLine xmlns="" xmlns:a14="http://schemas.microsoft.com/office/drawing/2010/main" w="9525">
                     <a:solidFill>
                       <a:srgbClr val="000000"/>
                     </a:solidFill>
@@ -9695,7 +9696,7 @@
               </a:ln>
               <a:extLst>
                 <a:ext uri="{91240B29-F687-4f45-9708-019B960494DF}">
-                  <a14:hiddenLine xmlns:a14="http://schemas.microsoft.com/office/drawing/2010/main" xmlns="" w="9525">
+                  <a14:hiddenLine xmlns="" xmlns:a14="http://schemas.microsoft.com/office/drawing/2010/main" w="9525">
                     <a:solidFill>
                       <a:srgbClr val="000000"/>
                     </a:solidFill>
@@ -9785,7 +9786,7 @@
               </a:ln>
               <a:extLst>
                 <a:ext uri="{91240B29-F687-4f45-9708-019B960494DF}">
-                  <a14:hiddenLine xmlns:a14="http://schemas.microsoft.com/office/drawing/2010/main" xmlns="" w="9525">
+                  <a14:hiddenLine xmlns="" xmlns:a14="http://schemas.microsoft.com/office/drawing/2010/main" w="9525">
                     <a:solidFill>
                       <a:srgbClr val="000000"/>
                     </a:solidFill>
@@ -9847,7 +9848,7 @@
               </a:ln>
               <a:extLst>
                 <a:ext uri="{91240B29-F687-4f45-9708-019B960494DF}">
-                  <a14:hiddenLine xmlns:a14="http://schemas.microsoft.com/office/drawing/2010/main" xmlns="" w="9525">
+                  <a14:hiddenLine xmlns="" xmlns:a14="http://schemas.microsoft.com/office/drawing/2010/main" w="9525">
                     <a:solidFill>
                       <a:srgbClr val="000000"/>
                     </a:solidFill>
@@ -9937,7 +9938,7 @@
               </a:ln>
               <a:extLst>
                 <a:ext uri="{91240B29-F687-4f45-9708-019B960494DF}">
-                  <a14:hiddenLine xmlns:a14="http://schemas.microsoft.com/office/drawing/2010/main" xmlns="" w="9525">
+                  <a14:hiddenLine xmlns="" xmlns:a14="http://schemas.microsoft.com/office/drawing/2010/main" w="9525">
                     <a:solidFill>
                       <a:srgbClr val="000000"/>
                     </a:solidFill>
@@ -9999,7 +10000,7 @@
               </a:ln>
               <a:extLst>
                 <a:ext uri="{91240B29-F687-4f45-9708-019B960494DF}">
-                  <a14:hiddenLine xmlns:a14="http://schemas.microsoft.com/office/drawing/2010/main" xmlns="" w="9525">
+                  <a14:hiddenLine xmlns="" xmlns:a14="http://schemas.microsoft.com/office/drawing/2010/main" w="9525">
                     <a:solidFill>
                       <a:srgbClr val="000000"/>
                     </a:solidFill>
@@ -10061,7 +10062,7 @@
               </a:ln>
               <a:extLst>
                 <a:ext uri="{91240B29-F687-4f45-9708-019B960494DF}">
-                  <a14:hiddenLine xmlns:a14="http://schemas.microsoft.com/office/drawing/2010/main" xmlns="" w="9525">
+                  <a14:hiddenLine xmlns="" xmlns:a14="http://schemas.microsoft.com/office/drawing/2010/main" w="9525">
                     <a:solidFill>
                       <a:srgbClr val="000000"/>
                     </a:solidFill>
@@ -10151,7 +10152,7 @@
               </a:ln>
               <a:extLst>
                 <a:ext uri="{91240B29-F687-4f45-9708-019B960494DF}">
-                  <a14:hiddenLine xmlns:a14="http://schemas.microsoft.com/office/drawing/2010/main" xmlns="" w="9525">
+                  <a14:hiddenLine xmlns="" xmlns:a14="http://schemas.microsoft.com/office/drawing/2010/main" w="9525">
                     <a:solidFill>
                       <a:srgbClr val="000000"/>
                     </a:solidFill>
@@ -10241,7 +10242,7 @@
               </a:ln>
               <a:extLst>
                 <a:ext uri="{91240B29-F687-4f45-9708-019B960494DF}">
-                  <a14:hiddenLine xmlns:a14="http://schemas.microsoft.com/office/drawing/2010/main" xmlns="" w="9525">
+                  <a14:hiddenLine xmlns="" xmlns:a14="http://schemas.microsoft.com/office/drawing/2010/main" w="9525">
                     <a:solidFill>
                       <a:srgbClr val="000000"/>
                     </a:solidFill>
@@ -10303,7 +10304,7 @@
               </a:ln>
               <a:extLst>
                 <a:ext uri="{91240B29-F687-4f45-9708-019B960494DF}">
-                  <a14:hiddenLine xmlns:a14="http://schemas.microsoft.com/office/drawing/2010/main" xmlns="" w="9525">
+                  <a14:hiddenLine xmlns="" xmlns:a14="http://schemas.microsoft.com/office/drawing/2010/main" w="9525">
                     <a:solidFill>
                       <a:srgbClr val="000000"/>
                     </a:solidFill>
@@ -10413,7 +10414,7 @@
               </a:ln>
               <a:extLst>
                 <a:ext uri="{91240B29-F687-4f45-9708-019B960494DF}">
-                  <a14:hiddenLine xmlns:a14="http://schemas.microsoft.com/office/drawing/2010/main" xmlns="" w="9525">
+                  <a14:hiddenLine xmlns="" xmlns:a14="http://schemas.microsoft.com/office/drawing/2010/main" w="9525">
                     <a:solidFill>
                       <a:srgbClr val="000000"/>
                     </a:solidFill>
@@ -10497,7 +10498,7 @@
               </a:ln>
               <a:extLst>
                 <a:ext uri="{91240B29-F687-4f45-9708-019B960494DF}">
-                  <a14:hiddenLine xmlns:a14="http://schemas.microsoft.com/office/drawing/2010/main" xmlns="" w="9525">
+                  <a14:hiddenLine xmlns="" xmlns:a14="http://schemas.microsoft.com/office/drawing/2010/main" w="9525">
                     <a:solidFill>
                       <a:srgbClr val="000000"/>
                     </a:solidFill>
@@ -10559,7 +10560,7 @@
               </a:ln>
               <a:extLst>
                 <a:ext uri="{91240B29-F687-4f45-9708-019B960494DF}">
-                  <a14:hiddenLine xmlns:a14="http://schemas.microsoft.com/office/drawing/2010/main" xmlns="" w="9525">
+                  <a14:hiddenLine xmlns="" xmlns:a14="http://schemas.microsoft.com/office/drawing/2010/main" w="9525">
                     <a:solidFill>
                       <a:srgbClr val="000000"/>
                     </a:solidFill>
@@ -10621,7 +10622,7 @@
               </a:ln>
               <a:extLst>
                 <a:ext uri="{91240B29-F687-4f45-9708-019B960494DF}">
-                  <a14:hiddenLine xmlns:a14="http://schemas.microsoft.com/office/drawing/2010/main" xmlns="" w="9525">
+                  <a14:hiddenLine xmlns="" xmlns:a14="http://schemas.microsoft.com/office/drawing/2010/main" w="9525">
                     <a:solidFill>
                       <a:srgbClr val="000000"/>
                     </a:solidFill>
@@ -10711,7 +10712,7 @@
               </a:ln>
               <a:extLst>
                 <a:ext uri="{91240B29-F687-4f45-9708-019B960494DF}">
-                  <a14:hiddenLine xmlns:a14="http://schemas.microsoft.com/office/drawing/2010/main" xmlns="" w="9525">
+                  <a14:hiddenLine xmlns="" xmlns:a14="http://schemas.microsoft.com/office/drawing/2010/main" w="9525">
                     <a:solidFill>
                       <a:srgbClr val="000000"/>
                     </a:solidFill>
@@ -10745,7 +10746,7 @@
               </a:ln>
               <a:extLst>
                 <a:ext uri="{91240B29-F687-4f45-9708-019B960494DF}">
-                  <a14:hiddenLine xmlns:a14="http://schemas.microsoft.com/office/drawing/2010/main" xmlns="" w="9525">
+                  <a14:hiddenLine xmlns="" xmlns:a14="http://schemas.microsoft.com/office/drawing/2010/main" w="9525">
                     <a:solidFill>
                       <a:srgbClr val="000000"/>
                     </a:solidFill>
@@ -10810,7 +10811,7 @@
               </a:ln>
               <a:extLst>
                 <a:ext uri="{91240B29-F687-4f45-9708-019B960494DF}">
-                  <a14:hiddenLine xmlns:a14="http://schemas.microsoft.com/office/drawing/2010/main" xmlns="" w="9525">
+                  <a14:hiddenLine xmlns="" xmlns:a14="http://schemas.microsoft.com/office/drawing/2010/main" w="9525">
                     <a:solidFill>
                       <a:srgbClr val="000000"/>
                     </a:solidFill>
@@ -10900,7 +10901,7 @@
               </a:ln>
               <a:extLst>
                 <a:ext uri="{91240B29-F687-4f45-9708-019B960494DF}">
-                  <a14:hiddenLine xmlns:a14="http://schemas.microsoft.com/office/drawing/2010/main" xmlns="" w="9525">
+                  <a14:hiddenLine xmlns="" xmlns:a14="http://schemas.microsoft.com/office/drawing/2010/main" w="9525">
                     <a:solidFill>
                       <a:srgbClr val="000000"/>
                     </a:solidFill>
@@ -10962,7 +10963,7 @@
               </a:ln>
               <a:extLst>
                 <a:ext uri="{91240B29-F687-4f45-9708-019B960494DF}">
-                  <a14:hiddenLine xmlns:a14="http://schemas.microsoft.com/office/drawing/2010/main" xmlns="" w="9525">
+                  <a14:hiddenLine xmlns="" xmlns:a14="http://schemas.microsoft.com/office/drawing/2010/main" w="9525">
                     <a:solidFill>
                       <a:srgbClr val="000000"/>
                     </a:solidFill>
@@ -11052,7 +11053,7 @@
               </a:ln>
               <a:extLst>
                 <a:ext uri="{91240B29-F687-4f45-9708-019B960494DF}">
-                  <a14:hiddenLine xmlns:a14="http://schemas.microsoft.com/office/drawing/2010/main" xmlns="" w="9525">
+                  <a14:hiddenLine xmlns="" xmlns:a14="http://schemas.microsoft.com/office/drawing/2010/main" w="9525">
                     <a:solidFill>
                       <a:srgbClr val="000000"/>
                     </a:solidFill>
@@ -11117,7 +11118,7 @@
               </a:ln>
               <a:extLst>
                 <a:ext uri="{91240B29-F687-4f45-9708-019B960494DF}">
-                  <a14:hiddenLine xmlns:a14="http://schemas.microsoft.com/office/drawing/2010/main" xmlns="" w="9525">
+                  <a14:hiddenLine xmlns="" xmlns:a14="http://schemas.microsoft.com/office/drawing/2010/main" w="9525">
                     <a:solidFill>
                       <a:srgbClr val="000000"/>
                     </a:solidFill>
@@ -11179,7 +11180,7 @@
               </a:ln>
               <a:extLst>
                 <a:ext uri="{91240B29-F687-4f45-9708-019B960494DF}">
-                  <a14:hiddenLine xmlns:a14="http://schemas.microsoft.com/office/drawing/2010/main" xmlns="" w="9525">
+                  <a14:hiddenLine xmlns="" xmlns:a14="http://schemas.microsoft.com/office/drawing/2010/main" w="9525">
                     <a:solidFill>
                       <a:srgbClr val="000000"/>
                     </a:solidFill>
@@ -11269,7 +11270,7 @@
               </a:ln>
               <a:extLst>
                 <a:ext uri="{91240B29-F687-4f45-9708-019B960494DF}">
-                  <a14:hiddenLine xmlns:a14="http://schemas.microsoft.com/office/drawing/2010/main" xmlns="" w="9525">
+                  <a14:hiddenLine xmlns="" xmlns:a14="http://schemas.microsoft.com/office/drawing/2010/main" w="9525">
                     <a:solidFill>
                       <a:srgbClr val="000000"/>
                     </a:solidFill>
@@ -11359,7 +11360,7 @@
               </a:ln>
               <a:extLst>
                 <a:ext uri="{91240B29-F687-4f45-9708-019B960494DF}">
-                  <a14:hiddenLine xmlns:a14="http://schemas.microsoft.com/office/drawing/2010/main" xmlns="" w="9525">
+                  <a14:hiddenLine xmlns="" xmlns:a14="http://schemas.microsoft.com/office/drawing/2010/main" w="9525">
                     <a:solidFill>
                       <a:srgbClr val="000000"/>
                     </a:solidFill>
@@ -11424,7 +11425,7 @@
               </a:ln>
               <a:extLst>
                 <a:ext uri="{91240B29-F687-4f45-9708-019B960494DF}">
-                  <a14:hiddenLine xmlns:a14="http://schemas.microsoft.com/office/drawing/2010/main" xmlns="" w="9525">
+                  <a14:hiddenLine xmlns="" xmlns:a14="http://schemas.microsoft.com/office/drawing/2010/main" w="9525">
                     <a:solidFill>
                       <a:srgbClr val="000000"/>
                     </a:solidFill>
@@ -11544,7 +11545,7 @@
               </a:ln>
               <a:extLst>
                 <a:ext uri="{91240B29-F687-4f45-9708-019B960494DF}">
-                  <a14:hiddenLine xmlns:a14="http://schemas.microsoft.com/office/drawing/2010/main" xmlns="" w="9525">
+                  <a14:hiddenLine xmlns="" xmlns:a14="http://schemas.microsoft.com/office/drawing/2010/main" w="9525">
                     <a:solidFill>
                       <a:srgbClr val="000000"/>
                     </a:solidFill>
@@ -11625,7 +11626,7 @@
               </a:ln>
               <a:extLst>
                 <a:ext uri="{91240B29-F687-4f45-9708-019B960494DF}">
-                  <a14:hiddenLine xmlns:a14="http://schemas.microsoft.com/office/drawing/2010/main" xmlns="" w="9525">
+                  <a14:hiddenLine xmlns="" xmlns:a14="http://schemas.microsoft.com/office/drawing/2010/main" w="9525">
                     <a:solidFill>
                       <a:srgbClr val="000000"/>
                     </a:solidFill>
@@ -11740,7 +11741,7 @@
               </a:ln>
               <a:extLst>
                 <a:ext uri="{91240B29-F687-4f45-9708-019B960494DF}">
-                  <a14:hiddenLine xmlns:a14="http://schemas.microsoft.com/office/drawing/2010/main" xmlns="" w="9525">
+                  <a14:hiddenLine xmlns="" xmlns:a14="http://schemas.microsoft.com/office/drawing/2010/main" w="9525">
                     <a:solidFill>
                       <a:srgbClr val="000000"/>
                     </a:solidFill>
@@ -11830,7 +11831,7 @@
               </a:ln>
               <a:extLst>
                 <a:ext uri="{91240B29-F687-4f45-9708-019B960494DF}">
-                  <a14:hiddenLine xmlns:a14="http://schemas.microsoft.com/office/drawing/2010/main" xmlns="" w="9525">
+                  <a14:hiddenLine xmlns="" xmlns:a14="http://schemas.microsoft.com/office/drawing/2010/main" w="9525">
                     <a:solidFill>
                       <a:srgbClr val="000000"/>
                     </a:solidFill>
@@ -11895,7 +11896,7 @@
               </a:ln>
               <a:extLst>
                 <a:ext uri="{91240B29-F687-4f45-9708-019B960494DF}">
-                  <a14:hiddenLine xmlns:a14="http://schemas.microsoft.com/office/drawing/2010/main" xmlns="" w="9525">
+                  <a14:hiddenLine xmlns="" xmlns:a14="http://schemas.microsoft.com/office/drawing/2010/main" w="9525">
                     <a:solidFill>
                       <a:srgbClr val="000000"/>
                     </a:solidFill>
@@ -11985,7 +11986,7 @@
               </a:ln>
               <a:extLst>
                 <a:ext uri="{91240B29-F687-4f45-9708-019B960494DF}">
-                  <a14:hiddenLine xmlns:a14="http://schemas.microsoft.com/office/drawing/2010/main" xmlns="" w="9525">
+                  <a14:hiddenLine xmlns="" xmlns:a14="http://schemas.microsoft.com/office/drawing/2010/main" w="9525">
                     <a:solidFill>
                       <a:srgbClr val="000000"/>
                     </a:solidFill>
@@ -12053,7 +12054,7 @@
               </a:ln>
               <a:extLst>
                 <a:ext uri="{91240B29-F687-4f45-9708-019B960494DF}">
-                  <a14:hiddenLine xmlns:a14="http://schemas.microsoft.com/office/drawing/2010/main" xmlns="" w="9525">
+                  <a14:hiddenLine xmlns="" xmlns:a14="http://schemas.microsoft.com/office/drawing/2010/main" w="9525">
                     <a:solidFill>
                       <a:srgbClr val="000000"/>
                     </a:solidFill>
@@ -12143,7 +12144,7 @@
               </a:ln>
               <a:extLst>
                 <a:ext uri="{91240B29-F687-4f45-9708-019B960494DF}">
-                  <a14:hiddenLine xmlns:a14="http://schemas.microsoft.com/office/drawing/2010/main" xmlns="" w="9525">
+                  <a14:hiddenLine xmlns="" xmlns:a14="http://schemas.microsoft.com/office/drawing/2010/main" w="9525">
                     <a:solidFill>
                       <a:srgbClr val="000000"/>
                     </a:solidFill>
@@ -12211,7 +12212,7 @@
               </a:ln>
               <a:extLst>
                 <a:ext uri="{91240B29-F687-4f45-9708-019B960494DF}">
-                  <a14:hiddenLine xmlns:a14="http://schemas.microsoft.com/office/drawing/2010/main" xmlns="" w="9525">
+                  <a14:hiddenLine xmlns="" xmlns:a14="http://schemas.microsoft.com/office/drawing/2010/main" w="9525">
                     <a:solidFill>
                       <a:srgbClr val="000000"/>
                     </a:solidFill>
@@ -12301,7 +12302,7 @@
               </a:ln>
               <a:extLst>
                 <a:ext uri="{91240B29-F687-4f45-9708-019B960494DF}">
-                  <a14:hiddenLine xmlns:a14="http://schemas.microsoft.com/office/drawing/2010/main" xmlns="" w="9525">
+                  <a14:hiddenLine xmlns="" xmlns:a14="http://schemas.microsoft.com/office/drawing/2010/main" w="9525">
                     <a:solidFill>
                       <a:srgbClr val="000000"/>
                     </a:solidFill>
@@ -12335,7 +12336,7 @@
               </a:ln>
               <a:extLst>
                 <a:ext uri="{91240B29-F687-4f45-9708-019B960494DF}">
-                  <a14:hiddenLine xmlns:a14="http://schemas.microsoft.com/office/drawing/2010/main" xmlns="" w="9525">
+                  <a14:hiddenLine xmlns="" xmlns:a14="http://schemas.microsoft.com/office/drawing/2010/main" w="9525">
                     <a:solidFill>
                       <a:srgbClr val="000000"/>
                     </a:solidFill>
@@ -12475,7 +12476,7 @@
           <a:p>
             <a:fld id="{EC4347D3-4C9A-C240-8F14-750059DFEEB0}" type="datetimeFigureOut">
               <a:rPr lang="en-US" smtClean="0"/>
-              <a:t>3/19/25</a:t>
+              <a:t>3/24/25</a:t>
             </a:fld>
             <a:endParaRPr lang="en-US"/>
           </a:p>
@@ -13626,6 +13627,161 @@
 </p:sld>
 </file>
 
+<file path=ppt/slides/slide14.xml><?xml version="1.0" encoding="utf-8"?>
+<p:sld xmlns:a="http://schemas.openxmlformats.org/drawingml/2006/main" xmlns:r="http://schemas.openxmlformats.org/officeDocument/2006/relationships" xmlns:p="http://schemas.openxmlformats.org/presentationml/2006/main">
+  <p:cSld>
+    <p:spTree>
+      <p:nvGrpSpPr>
+        <p:cNvPr id="1" name=""/>
+        <p:cNvGrpSpPr/>
+        <p:nvPr/>
+      </p:nvGrpSpPr>
+      <p:grpSpPr>
+        <a:xfrm>
+          <a:off x="0" y="0"/>
+          <a:ext cx="0" cy="0"/>
+          <a:chOff x="0" y="0"/>
+          <a:chExt cx="0" cy="0"/>
+        </a:xfrm>
+      </p:grpSpPr>
+      <p:sp>
+        <p:nvSpPr>
+          <p:cNvPr id="6146" name="Rectangle 2"/>
+          <p:cNvSpPr>
+            <a:spLocks noGrp="1" noChangeArrowheads="1"/>
+          </p:cNvSpPr>
+          <p:nvPr>
+            <p:ph type="title"/>
+            <p:custDataLst>
+              <p:tags r:id="rId1"/>
+            </p:custDataLst>
+          </p:nvPr>
+        </p:nvSpPr>
+        <p:spPr>
+          <a:xfrm>
+            <a:off x="1141413" y="284084"/>
+            <a:ext cx="9905998" cy="620791"/>
+          </a:xfrm>
+        </p:spPr>
+        <p:txBody>
+          <a:bodyPr/>
+          <a:lstStyle/>
+          <a:p>
+            <a:pPr algn="ctr"/>
+            <a:r>
+              <a:rPr lang="en-US" dirty="0"/>
+              <a:t>Lecture 16: 3/24/25</a:t>
+            </a:r>
+          </a:p>
+        </p:txBody>
+      </p:sp>
+      <p:sp>
+        <p:nvSpPr>
+          <p:cNvPr id="6147" name="Rectangle 3"/>
+          <p:cNvSpPr>
+            <a:spLocks noGrp="1" noChangeArrowheads="1"/>
+          </p:cNvSpPr>
+          <p:nvPr>
+            <p:ph idx="1"/>
+            <p:custDataLst>
+              <p:tags r:id="rId2"/>
+            </p:custDataLst>
+          </p:nvPr>
+        </p:nvSpPr>
+        <p:spPr>
+          <a:xfrm>
+            <a:off x="1021404" y="1054500"/>
+            <a:ext cx="10204315" cy="5346298"/>
+          </a:xfrm>
+        </p:spPr>
+        <p:txBody>
+          <a:bodyPr>
+            <a:normAutofit fontScale="92500" lnSpcReduction="10000"/>
+          </a:bodyPr>
+          <a:lstStyle/>
+          <a:p>
+            <a:r>
+              <a:rPr lang="en-US" dirty="0"/>
+              <a:t>First quiz has been taken (Wed. before break).</a:t>
+            </a:r>
+          </a:p>
+          <a:p>
+            <a:pPr lvl="1"/>
+            <a:r>
+              <a:rPr lang="en-US" dirty="0"/>
+              <a:t>We are officially behind on grading this for you. I’ll try to kick the TAs in the butt a bit!</a:t>
+            </a:r>
+          </a:p>
+          <a:p>
+            <a:r>
+              <a:rPr lang="en-US" dirty="0"/>
+              <a:t>We DO have class this Friday.</a:t>
+            </a:r>
+          </a:p>
+          <a:p>
+            <a:pPr lvl="1"/>
+            <a:r>
+              <a:rPr lang="en-US" dirty="0"/>
+              <a:t>Computational Geometry homework will be assigned that morning.</a:t>
+            </a:r>
+          </a:p>
+          <a:p>
+            <a:pPr lvl="1"/>
+            <a:r>
+              <a:rPr lang="en-US" dirty="0"/>
+              <a:t>Should be somewhat straightforward but involve implementing multiple algorithms and patching them together (so not totally trivial)</a:t>
+            </a:r>
+          </a:p>
+          <a:p>
+            <a:r>
+              <a:rPr lang="en-US" dirty="0"/>
+              <a:t>Final project:</a:t>
+            </a:r>
+          </a:p>
+          <a:p>
+            <a:pPr lvl="1"/>
+            <a:r>
+              <a:rPr lang="en-US" dirty="0"/>
+              <a:t>I’ve closed the sheet. If you still need to sign up you need to email me (now, please!)</a:t>
+            </a:r>
+          </a:p>
+          <a:p>
+            <a:pPr lvl="1"/>
+            <a:r>
+              <a:rPr lang="en-US" dirty="0"/>
+              <a:t>You should be reading and digesting your algorithm with your group. Get an understanding of how it works. Let us know if you have any questions about the depth you are required to go to.</a:t>
+            </a:r>
+          </a:p>
+          <a:p>
+            <a:r>
+              <a:rPr lang="en-US" dirty="0"/>
+              <a:t>We will have an attendance check today</a:t>
+            </a:r>
+          </a:p>
+          <a:p>
+            <a:r>
+              <a:rPr lang="en-US" dirty="0"/>
+              <a:t>Today we will continue discussing comp. geo. algorithms.</a:t>
+            </a:r>
+          </a:p>
+          <a:p>
+            <a:endParaRPr lang="en-US" dirty="0"/>
+          </a:p>
+        </p:txBody>
+      </p:sp>
+    </p:spTree>
+    <p:extLst>
+      <p:ext uri="{BB962C8B-B14F-4D97-AF65-F5344CB8AC3E}">
+        <p14:creationId xmlns:p14="http://schemas.microsoft.com/office/powerpoint/2010/main" val="2735668533"/>
+      </p:ext>
+    </p:extLst>
+  </p:cSld>
+  <p:clrMapOvr>
+    <a:masterClrMapping/>
+  </p:clrMapOvr>
+</p:sld>
+</file>
+
 <file path=ppt/slides/slide2.xml><?xml version="1.0" encoding="utf-8"?>
 <p:sld xmlns:a="http://schemas.openxmlformats.org/drawingml/2006/main" xmlns:r="http://schemas.openxmlformats.org/officeDocument/2006/relationships" xmlns:p="http://schemas.openxmlformats.org/presentationml/2006/main">
   <p:cSld>
@@ -14937,6 +15093,18 @@
 </file>
 
 <file path=ppt/tags/tag24.xml><?xml version="1.0" encoding="utf-8"?>
+<p:tagLst xmlns:a="http://schemas.openxmlformats.org/drawingml/2006/main" xmlns:r="http://schemas.openxmlformats.org/officeDocument/2006/relationships" xmlns:p="http://schemas.openxmlformats.org/presentationml/2006/main">
+  <p:tag name="_INSTRUCTOR VIEW19C14C36-AC8E-43BC-9DB6-C2AAF774C7DC|PANE__TAG" val="_"/>
+</p:tagLst>
+</file>
+
+<file path=ppt/tags/tag25.xml><?xml version="1.0" encoding="utf-8"?>
+<p:tagLst xmlns:a="http://schemas.openxmlformats.org/drawingml/2006/main" xmlns:r="http://schemas.openxmlformats.org/officeDocument/2006/relationships" xmlns:p="http://schemas.openxmlformats.org/presentationml/2006/main">
+  <p:tag name="_INSTRUCTOR VIEW19C14C36-AC8E-43BC-9DB6-C2AAF774C7DC|PANE__TAG" val="_"/>
+</p:tagLst>
+</file>
+
+<file path=ppt/tags/tag26.xml><?xml version="1.0" encoding="utf-8"?>
 <p:tagLst xmlns:a="http://schemas.openxmlformats.org/drawingml/2006/main" xmlns:r="http://schemas.openxmlformats.org/officeDocument/2006/relationships" xmlns:p="http://schemas.openxmlformats.org/presentationml/2006/main">
   <p:tag name="_INSTRUCTOR VIEW19C14C36-AC8E-43BC-9DB6-C2AAF774C7DC|PANE__TAG" val="_"/>
 </p:tagLst>

</xml_diff>

<commit_message>
lots of slides and announcements
</commit_message>
<xml_diff>
--- a/slides/00-DailyAnnouncements.pptx
+++ b/slides/00-DailyAnnouncements.pptx
@@ -5,7 +5,7 @@
     <p:sldMasterId id="2147484006" r:id="rId1"/>
   </p:sldMasterIdLst>
   <p:notesMasterIdLst>
-    <p:notesMasterId r:id="rId17"/>
+    <p:notesMasterId r:id="rId19"/>
   </p:notesMasterIdLst>
   <p:sldIdLst>
     <p:sldId id="256" r:id="rId2"/>
@@ -23,6 +23,8 @@
     <p:sldId id="516" r:id="rId14"/>
     <p:sldId id="517" r:id="rId15"/>
     <p:sldId id="518" r:id="rId16"/>
+    <p:sldId id="519" r:id="rId17"/>
+    <p:sldId id="520" r:id="rId18"/>
   </p:sldIdLst>
   <p:sldSz cx="12192000" cy="6858000"/>
   <p:notesSz cx="6858000" cy="9144000"/>
@@ -211,7 +213,7 @@
           <a:p>
             <a:fld id="{C5B45307-6ED4-B142-BD64-10F739779302}" type="datetimeFigureOut">
               <a:rPr lang="en-US" smtClean="0"/>
-              <a:t>3/26/25</a:t>
+              <a:t>4/2/25</a:t>
             </a:fld>
             <a:endParaRPr lang="en-US"/>
           </a:p>
@@ -4844,7 +4846,7 @@
           <a:p>
             <a:fld id="{EC4347D3-4C9A-C240-8F14-750059DFEEB0}" type="datetimeFigureOut">
               <a:rPr lang="en-US" smtClean="0"/>
-              <a:t>3/26/25</a:t>
+              <a:t>4/2/25</a:t>
             </a:fld>
             <a:endParaRPr lang="en-US"/>
           </a:p>
@@ -5111,7 +5113,7 @@
           <a:p>
             <a:fld id="{EC4347D3-4C9A-C240-8F14-750059DFEEB0}" type="datetimeFigureOut">
               <a:rPr lang="en-US" smtClean="0"/>
-              <a:t>3/26/25</a:t>
+              <a:t>4/2/25</a:t>
             </a:fld>
             <a:endParaRPr lang="en-US"/>
           </a:p>
@@ -5307,7 +5309,7 @@
           <a:p>
             <a:fld id="{EC4347D3-4C9A-C240-8F14-750059DFEEB0}" type="datetimeFigureOut">
               <a:rPr lang="en-US" smtClean="0"/>
-              <a:t>3/26/25</a:t>
+              <a:t>4/2/25</a:t>
             </a:fld>
             <a:endParaRPr lang="en-US"/>
           </a:p>
@@ -5570,7 +5572,7 @@
           <a:p>
             <a:fld id="{EC4347D3-4C9A-C240-8F14-750059DFEEB0}" type="datetimeFigureOut">
               <a:rPr lang="en-US" smtClean="0"/>
-              <a:t>3/26/25</a:t>
+              <a:t>4/2/25</a:t>
             </a:fld>
             <a:endParaRPr lang="en-US"/>
           </a:p>
@@ -6004,7 +6006,7 @@
           <a:p>
             <a:fld id="{EC4347D3-4C9A-C240-8F14-750059DFEEB0}" type="datetimeFigureOut">
               <a:rPr lang="en-US" smtClean="0"/>
-              <a:t>3/26/25</a:t>
+              <a:t>4/2/25</a:t>
             </a:fld>
             <a:endParaRPr lang="en-US"/>
           </a:p>
@@ -6550,7 +6552,7 @@
           <a:p>
             <a:fld id="{EC4347D3-4C9A-C240-8F14-750059DFEEB0}" type="datetimeFigureOut">
               <a:rPr lang="en-US" smtClean="0"/>
-              <a:t>3/26/25</a:t>
+              <a:t>4/2/25</a:t>
             </a:fld>
             <a:endParaRPr lang="en-US"/>
           </a:p>
@@ -7270,7 +7272,7 @@
           <a:p>
             <a:fld id="{EC4347D3-4C9A-C240-8F14-750059DFEEB0}" type="datetimeFigureOut">
               <a:rPr lang="en-US" smtClean="0"/>
-              <a:t>3/26/25</a:t>
+              <a:t>4/2/25</a:t>
             </a:fld>
             <a:endParaRPr lang="en-US"/>
           </a:p>
@@ -7440,7 +7442,7 @@
           <a:p>
             <a:fld id="{EC4347D3-4C9A-C240-8F14-750059DFEEB0}" type="datetimeFigureOut">
               <a:rPr lang="en-US" smtClean="0"/>
-              <a:t>3/26/25</a:t>
+              <a:t>4/2/25</a:t>
             </a:fld>
             <a:endParaRPr lang="en-US"/>
           </a:p>
@@ -7620,7 +7622,7 @@
           <a:p>
             <a:fld id="{EC4347D3-4C9A-C240-8F14-750059DFEEB0}" type="datetimeFigureOut">
               <a:rPr lang="en-US" smtClean="0"/>
-              <a:t>3/26/25</a:t>
+              <a:t>4/2/25</a:t>
             </a:fld>
             <a:endParaRPr lang="en-US"/>
           </a:p>
@@ -7790,7 +7792,7 @@
           <a:p>
             <a:fld id="{EC4347D3-4C9A-C240-8F14-750059DFEEB0}" type="datetimeFigureOut">
               <a:rPr lang="en-US" smtClean="0"/>
-              <a:t>3/26/25</a:t>
+              <a:t>4/2/25</a:t>
             </a:fld>
             <a:endParaRPr lang="en-US"/>
           </a:p>
@@ -8040,7 +8042,7 @@
           <a:p>
             <a:fld id="{EC4347D3-4C9A-C240-8F14-750059DFEEB0}" type="datetimeFigureOut">
               <a:rPr lang="en-US" smtClean="0"/>
-              <a:t>3/26/25</a:t>
+              <a:t>4/2/25</a:t>
             </a:fld>
             <a:endParaRPr lang="en-US"/>
           </a:p>
@@ -8272,7 +8274,7 @@
           <a:p>
             <a:fld id="{EC4347D3-4C9A-C240-8F14-750059DFEEB0}" type="datetimeFigureOut">
               <a:rPr lang="en-US" smtClean="0"/>
-              <a:t>3/26/25</a:t>
+              <a:t>4/2/25</a:t>
             </a:fld>
             <a:endParaRPr lang="en-US"/>
           </a:p>
@@ -8658,7 +8660,7 @@
           <a:p>
             <a:fld id="{EC4347D3-4C9A-C240-8F14-750059DFEEB0}" type="datetimeFigureOut">
               <a:rPr lang="en-US" smtClean="0"/>
-              <a:t>3/26/25</a:t>
+              <a:t>4/2/25</a:t>
             </a:fld>
             <a:endParaRPr lang="en-US"/>
           </a:p>
@@ -8781,7 +8783,7 @@
           <a:p>
             <a:fld id="{EC4347D3-4C9A-C240-8F14-750059DFEEB0}" type="datetimeFigureOut">
               <a:rPr lang="en-US" smtClean="0"/>
-              <a:t>3/26/25</a:t>
+              <a:t>4/2/25</a:t>
             </a:fld>
             <a:endParaRPr lang="en-US"/>
           </a:p>
@@ -8876,7 +8878,7 @@
           <a:p>
             <a:fld id="{EC4347D3-4C9A-C240-8F14-750059DFEEB0}" type="datetimeFigureOut">
               <a:rPr lang="en-US" smtClean="0"/>
-              <a:t>3/26/25</a:t>
+              <a:t>4/2/25</a:t>
             </a:fld>
             <a:endParaRPr lang="en-US"/>
           </a:p>
@@ -9125,7 +9127,7 @@
           <a:p>
             <a:fld id="{EC4347D3-4C9A-C240-8F14-750059DFEEB0}" type="datetimeFigureOut">
               <a:rPr lang="en-US" smtClean="0"/>
-              <a:t>3/26/25</a:t>
+              <a:t>4/2/25</a:t>
             </a:fld>
             <a:endParaRPr lang="en-US"/>
           </a:p>
@@ -9410,7 +9412,7 @@
           <a:p>
             <a:fld id="{EC4347D3-4C9A-C240-8F14-750059DFEEB0}" type="datetimeFigureOut">
               <a:rPr lang="en-US" smtClean="0"/>
-              <a:t>3/26/25</a:t>
+              <a:t>4/2/25</a:t>
             </a:fld>
             <a:endParaRPr lang="en-US"/>
           </a:p>
@@ -12477,7 +12479,7 @@
           <a:p>
             <a:fld id="{EC4347D3-4C9A-C240-8F14-750059DFEEB0}" type="datetimeFigureOut">
               <a:rPr lang="en-US" smtClean="0"/>
-              <a:t>3/26/25</a:t>
+              <a:t>4/2/25</a:t>
             </a:fld>
             <a:endParaRPr lang="en-US"/>
           </a:p>
@@ -13938,6 +13940,326 @@
 </p:sld>
 </file>
 
+<file path=ppt/slides/slide16.xml><?xml version="1.0" encoding="utf-8"?>
+<p:sld xmlns:a="http://schemas.openxmlformats.org/drawingml/2006/main" xmlns:r="http://schemas.openxmlformats.org/officeDocument/2006/relationships" xmlns:p="http://schemas.openxmlformats.org/presentationml/2006/main">
+  <p:cSld>
+    <p:spTree>
+      <p:nvGrpSpPr>
+        <p:cNvPr id="1" name=""/>
+        <p:cNvGrpSpPr/>
+        <p:nvPr/>
+      </p:nvGrpSpPr>
+      <p:grpSpPr>
+        <a:xfrm>
+          <a:off x="0" y="0"/>
+          <a:ext cx="0" cy="0"/>
+          <a:chOff x="0" y="0"/>
+          <a:chExt cx="0" cy="0"/>
+        </a:xfrm>
+      </p:grpSpPr>
+      <p:sp>
+        <p:nvSpPr>
+          <p:cNvPr id="6146" name="Rectangle 2"/>
+          <p:cNvSpPr>
+            <a:spLocks noGrp="1" noChangeArrowheads="1"/>
+          </p:cNvSpPr>
+          <p:nvPr>
+            <p:ph type="title"/>
+            <p:custDataLst>
+              <p:tags r:id="rId1"/>
+            </p:custDataLst>
+          </p:nvPr>
+        </p:nvSpPr>
+        <p:spPr>
+          <a:xfrm>
+            <a:off x="1141413" y="284084"/>
+            <a:ext cx="9905998" cy="620791"/>
+          </a:xfrm>
+        </p:spPr>
+        <p:txBody>
+          <a:bodyPr/>
+          <a:lstStyle/>
+          <a:p>
+            <a:pPr algn="ctr"/>
+            <a:r>
+              <a:rPr lang="en-US" dirty="0"/>
+              <a:t>Lecture 18: 3/31/25</a:t>
+            </a:r>
+          </a:p>
+        </p:txBody>
+      </p:sp>
+      <p:sp>
+        <p:nvSpPr>
+          <p:cNvPr id="6147" name="Rectangle 3"/>
+          <p:cNvSpPr>
+            <a:spLocks noGrp="1" noChangeArrowheads="1"/>
+          </p:cNvSpPr>
+          <p:nvPr>
+            <p:ph idx="1"/>
+            <p:custDataLst>
+              <p:tags r:id="rId2"/>
+            </p:custDataLst>
+          </p:nvPr>
+        </p:nvSpPr>
+        <p:spPr>
+          <a:xfrm>
+            <a:off x="1021404" y="1054500"/>
+            <a:ext cx="10204315" cy="5346298"/>
+          </a:xfrm>
+        </p:spPr>
+        <p:txBody>
+          <a:bodyPr>
+            <a:normAutofit/>
+          </a:bodyPr>
+          <a:lstStyle/>
+          <a:p>
+            <a:r>
+              <a:rPr lang="en-US" dirty="0"/>
+              <a:t>Cows homework has been released</a:t>
+            </a:r>
+          </a:p>
+          <a:p>
+            <a:pPr lvl="1"/>
+            <a:r>
+              <a:rPr lang="en-US" dirty="0"/>
+              <a:t>It due on Wednesday, extension to </a:t>
+            </a:r>
+            <a:r>
+              <a:rPr lang="en-US" dirty="0" err="1"/>
+              <a:t>MOOOnday</a:t>
+            </a:r>
+            <a:endParaRPr lang="en-US" dirty="0"/>
+          </a:p>
+          <a:p>
+            <a:r>
+              <a:rPr lang="en-US" dirty="0"/>
+              <a:t>No class this Friday (No new homework coming out)</a:t>
+            </a:r>
+          </a:p>
+          <a:p>
+            <a:r>
+              <a:rPr lang="en-US" dirty="0"/>
+              <a:t>Final project:</a:t>
+            </a:r>
+          </a:p>
+          <a:p>
+            <a:pPr lvl="1"/>
+            <a:r>
+              <a:rPr lang="en-US" dirty="0"/>
+              <a:t>Be thinking about this / getting started. You don’t want to do the whole thing at the end.</a:t>
+            </a:r>
+          </a:p>
+          <a:p>
+            <a:pPr lvl="1"/>
+            <a:r>
+              <a:rPr lang="en-US" dirty="0"/>
+              <a:t>Let me know if you have any questions.</a:t>
+            </a:r>
+          </a:p>
+          <a:p>
+            <a:r>
+              <a:rPr lang="en-US" dirty="0"/>
+              <a:t>We will have an attendance check today</a:t>
+            </a:r>
+          </a:p>
+          <a:p>
+            <a:r>
+              <a:rPr lang="en-US" dirty="0"/>
+              <a:t>Today we will move on to the next topic...Van </a:t>
+            </a:r>
+            <a:r>
+              <a:rPr lang="en-US" dirty="0" err="1"/>
+              <a:t>Emde</a:t>
+            </a:r>
+            <a:r>
+              <a:rPr lang="en-US" dirty="0"/>
+              <a:t> Boas Trees</a:t>
+            </a:r>
+          </a:p>
+          <a:p>
+            <a:endParaRPr lang="en-US" dirty="0"/>
+          </a:p>
+        </p:txBody>
+      </p:sp>
+    </p:spTree>
+    <p:extLst>
+      <p:ext uri="{BB962C8B-B14F-4D97-AF65-F5344CB8AC3E}">
+        <p14:creationId xmlns:p14="http://schemas.microsoft.com/office/powerpoint/2010/main" val="2499084838"/>
+      </p:ext>
+    </p:extLst>
+  </p:cSld>
+  <p:clrMapOvr>
+    <a:masterClrMapping/>
+  </p:clrMapOvr>
+</p:sld>
+</file>
+
+<file path=ppt/slides/slide17.xml><?xml version="1.0" encoding="utf-8"?>
+<p:sld xmlns:a="http://schemas.openxmlformats.org/drawingml/2006/main" xmlns:r="http://schemas.openxmlformats.org/officeDocument/2006/relationships" xmlns:p="http://schemas.openxmlformats.org/presentationml/2006/main">
+  <p:cSld>
+    <p:spTree>
+      <p:nvGrpSpPr>
+        <p:cNvPr id="1" name=""/>
+        <p:cNvGrpSpPr/>
+        <p:nvPr/>
+      </p:nvGrpSpPr>
+      <p:grpSpPr>
+        <a:xfrm>
+          <a:off x="0" y="0"/>
+          <a:ext cx="0" cy="0"/>
+          <a:chOff x="0" y="0"/>
+          <a:chExt cx="0" cy="0"/>
+        </a:xfrm>
+      </p:grpSpPr>
+      <p:sp>
+        <p:nvSpPr>
+          <p:cNvPr id="6146" name="Rectangle 2"/>
+          <p:cNvSpPr>
+            <a:spLocks noGrp="1" noChangeArrowheads="1"/>
+          </p:cNvSpPr>
+          <p:nvPr>
+            <p:ph type="title"/>
+            <p:custDataLst>
+              <p:tags r:id="rId1"/>
+            </p:custDataLst>
+          </p:nvPr>
+        </p:nvSpPr>
+        <p:spPr>
+          <a:xfrm>
+            <a:off x="1141413" y="284084"/>
+            <a:ext cx="9905998" cy="620791"/>
+          </a:xfrm>
+        </p:spPr>
+        <p:txBody>
+          <a:bodyPr/>
+          <a:lstStyle/>
+          <a:p>
+            <a:pPr algn="ctr"/>
+            <a:r>
+              <a:rPr lang="en-US" dirty="0"/>
+              <a:t>Lecture 19: 4/2/25</a:t>
+            </a:r>
+          </a:p>
+        </p:txBody>
+      </p:sp>
+      <p:sp>
+        <p:nvSpPr>
+          <p:cNvPr id="6147" name="Rectangle 3"/>
+          <p:cNvSpPr>
+            <a:spLocks noGrp="1" noChangeArrowheads="1"/>
+          </p:cNvSpPr>
+          <p:nvPr>
+            <p:ph idx="1"/>
+            <p:custDataLst>
+              <p:tags r:id="rId2"/>
+            </p:custDataLst>
+          </p:nvPr>
+        </p:nvSpPr>
+        <p:spPr>
+          <a:xfrm>
+            <a:off x="1021404" y="1054500"/>
+            <a:ext cx="10204315" cy="5346298"/>
+          </a:xfrm>
+        </p:spPr>
+        <p:txBody>
+          <a:bodyPr>
+            <a:normAutofit/>
+          </a:bodyPr>
+          <a:lstStyle/>
+          <a:p>
+            <a:r>
+              <a:rPr lang="en-US" dirty="0"/>
+              <a:t>Welcome to April…semester coming to an end pretty quickly here.</a:t>
+            </a:r>
+          </a:p>
+          <a:p>
+            <a:r>
+              <a:rPr lang="en-US" dirty="0"/>
+              <a:t>Cows homework has been released</a:t>
+            </a:r>
+          </a:p>
+          <a:p>
+            <a:pPr lvl="1"/>
+            <a:r>
+              <a:rPr lang="en-US" dirty="0"/>
+              <a:t>It due on Wednesday, extension to </a:t>
+            </a:r>
+            <a:r>
+              <a:rPr lang="en-US" dirty="0" err="1"/>
+              <a:t>MOOOnday</a:t>
+            </a:r>
+            <a:endParaRPr lang="en-US" dirty="0"/>
+          </a:p>
+          <a:p>
+            <a:r>
+              <a:rPr lang="en-US" dirty="0"/>
+              <a:t>No class this Friday (No new homework coming out)</a:t>
+            </a:r>
+          </a:p>
+          <a:p>
+            <a:r>
+              <a:rPr lang="en-US" dirty="0"/>
+              <a:t>Final project:</a:t>
+            </a:r>
+          </a:p>
+          <a:p>
+            <a:pPr lvl="1"/>
+            <a:r>
+              <a:rPr lang="en-US" dirty="0"/>
+              <a:t>Be thinking about this / getting started. You don’t want to do the whole thing at the end.</a:t>
+            </a:r>
+          </a:p>
+          <a:p>
+            <a:pPr lvl="1"/>
+            <a:r>
+              <a:rPr lang="en-US" dirty="0"/>
+              <a:t>Let me know if you have any questions.</a:t>
+            </a:r>
+          </a:p>
+          <a:p>
+            <a:r>
+              <a:rPr lang="en-US" dirty="0"/>
+              <a:t>We will have an attendance check today</a:t>
+            </a:r>
+          </a:p>
+          <a:p>
+            <a:r>
+              <a:rPr lang="en-US" dirty="0"/>
+              <a:t>Don’t forget that we do have a second quiz. It will be in a couple weeks.</a:t>
+            </a:r>
+          </a:p>
+          <a:p>
+            <a:r>
+              <a:rPr lang="en-US" dirty="0"/>
+              <a:t>Today we will continue on to the next topic...Van </a:t>
+            </a:r>
+            <a:r>
+              <a:rPr lang="en-US" dirty="0" err="1"/>
+              <a:t>Emde</a:t>
+            </a:r>
+            <a:r>
+              <a:rPr lang="en-US" dirty="0"/>
+              <a:t> Boas Trees</a:t>
+            </a:r>
+          </a:p>
+          <a:p>
+            <a:endParaRPr lang="en-US" dirty="0"/>
+          </a:p>
+        </p:txBody>
+      </p:sp>
+    </p:spTree>
+    <p:extLst>
+      <p:ext uri="{BB962C8B-B14F-4D97-AF65-F5344CB8AC3E}">
+        <p14:creationId xmlns:p14="http://schemas.microsoft.com/office/powerpoint/2010/main" val="1194353119"/>
+      </p:ext>
+    </p:extLst>
+  </p:cSld>
+  <p:clrMapOvr>
+    <a:masterClrMapping/>
+  </p:clrMapOvr>
+</p:sld>
+</file>
+
 <file path=ppt/slides/slide2.xml><?xml version="1.0" encoding="utf-8"?>
 <p:sld xmlns:a="http://schemas.openxmlformats.org/drawingml/2006/main" xmlns:r="http://schemas.openxmlformats.org/officeDocument/2006/relationships" xmlns:p="http://schemas.openxmlformats.org/presentationml/2006/main">
   <p:cSld>
@@ -15278,7 +15600,31 @@
 </p:tagLst>
 </file>
 
+<file path=ppt/tags/tag29.xml><?xml version="1.0" encoding="utf-8"?>
+<p:tagLst xmlns:a="http://schemas.openxmlformats.org/drawingml/2006/main" xmlns:r="http://schemas.openxmlformats.org/officeDocument/2006/relationships" xmlns:p="http://schemas.openxmlformats.org/presentationml/2006/main">
+  <p:tag name="_INSTRUCTOR VIEW19C14C36-AC8E-43BC-9DB6-C2AAF774C7DC|PANE__TAG" val="_"/>
+</p:tagLst>
+</file>
+
 <file path=ppt/tags/tag3.xml><?xml version="1.0" encoding="utf-8"?>
+<p:tagLst xmlns:a="http://schemas.openxmlformats.org/drawingml/2006/main" xmlns:r="http://schemas.openxmlformats.org/officeDocument/2006/relationships" xmlns:p="http://schemas.openxmlformats.org/presentationml/2006/main">
+  <p:tag name="_INSTRUCTOR VIEW19C14C36-AC8E-43BC-9DB6-C2AAF774C7DC|PANE__TAG" val="_"/>
+</p:tagLst>
+</file>
+
+<file path=ppt/tags/tag30.xml><?xml version="1.0" encoding="utf-8"?>
+<p:tagLst xmlns:a="http://schemas.openxmlformats.org/drawingml/2006/main" xmlns:r="http://schemas.openxmlformats.org/officeDocument/2006/relationships" xmlns:p="http://schemas.openxmlformats.org/presentationml/2006/main">
+  <p:tag name="_INSTRUCTOR VIEW19C14C36-AC8E-43BC-9DB6-C2AAF774C7DC|PANE__TAG" val="_"/>
+</p:tagLst>
+</file>
+
+<file path=ppt/tags/tag31.xml><?xml version="1.0" encoding="utf-8"?>
+<p:tagLst xmlns:a="http://schemas.openxmlformats.org/drawingml/2006/main" xmlns:r="http://schemas.openxmlformats.org/officeDocument/2006/relationships" xmlns:p="http://schemas.openxmlformats.org/presentationml/2006/main">
+  <p:tag name="_INSTRUCTOR VIEW19C14C36-AC8E-43BC-9DB6-C2AAF774C7DC|PANE__TAG" val="_"/>
+</p:tagLst>
+</file>
+
+<file path=ppt/tags/tag32.xml><?xml version="1.0" encoding="utf-8"?>
 <p:tagLst xmlns:a="http://schemas.openxmlformats.org/drawingml/2006/main" xmlns:r="http://schemas.openxmlformats.org/officeDocument/2006/relationships" xmlns:p="http://schemas.openxmlformats.org/presentationml/2006/main">
   <p:tag name="_INSTRUCTOR VIEW19C14C36-AC8E-43BC-9DB6-C2AAF774C7DC|PANE__TAG" val="_"/>
 </p:tagLst>

</xml_diff>

<commit_message>
small changes and announce
</commit_message>
<xml_diff>
--- a/slides/00-DailyAnnouncements.pptx
+++ b/slides/00-DailyAnnouncements.pptx
@@ -5,7 +5,7 @@
     <p:sldMasterId id="2147484006" r:id="rId1"/>
   </p:sldMasterIdLst>
   <p:notesMasterIdLst>
-    <p:notesMasterId r:id="rId20"/>
+    <p:notesMasterId r:id="rId21"/>
   </p:notesMasterIdLst>
   <p:sldIdLst>
     <p:sldId id="256" r:id="rId2"/>
@@ -26,6 +26,7 @@
     <p:sldId id="519" r:id="rId17"/>
     <p:sldId id="520" r:id="rId18"/>
     <p:sldId id="521" r:id="rId19"/>
+    <p:sldId id="522" r:id="rId20"/>
   </p:sldIdLst>
   <p:sldSz cx="12192000" cy="6858000"/>
   <p:notesSz cx="6858000" cy="9144000"/>
@@ -214,7 +215,7 @@
           <a:p>
             <a:fld id="{C5B45307-6ED4-B142-BD64-10F739779302}" type="datetimeFigureOut">
               <a:rPr lang="en-US" smtClean="0"/>
-              <a:t>4/7/25</a:t>
+              <a:t>4/9/25</a:t>
             </a:fld>
             <a:endParaRPr lang="en-US"/>
           </a:p>
@@ -622,7 +623,7 @@
           <a:noFill/>
           <a:extLst>
             <a:ext uri="{909E8E84-426E-40dd-AFC4-6F175D3DCCD1}">
-              <a14:hiddenFill xmlns="" xmlns:a14="http://schemas.microsoft.com/office/drawing/2010/main">
+              <a14:hiddenFill xmlns:a14="http://schemas.microsoft.com/office/drawing/2010/main" xmlns="">
                 <a:solidFill>
                   <a:srgbClr val="FFFFFF"/>
                 </a:solidFill>
@@ -681,7 +682,7 @@
             </a:ln>
             <a:extLst>
               <a:ext uri="{91240B29-F687-4f45-9708-019B960494DF}">
-                <a14:hiddenLine xmlns="" xmlns:a14="http://schemas.microsoft.com/office/drawing/2010/main" w="9525">
+                <a14:hiddenLine xmlns:a14="http://schemas.microsoft.com/office/drawing/2010/main" xmlns="" w="9525">
                   <a:solidFill>
                     <a:srgbClr val="000000"/>
                   </a:solidFill>
@@ -771,7 +772,7 @@
             </a:ln>
             <a:extLst>
               <a:ext uri="{91240B29-F687-4f45-9708-019B960494DF}">
-                <a14:hiddenLine xmlns="" xmlns:a14="http://schemas.microsoft.com/office/drawing/2010/main" w="9525">
+                <a14:hiddenLine xmlns:a14="http://schemas.microsoft.com/office/drawing/2010/main" xmlns="" w="9525">
                   <a:solidFill>
                     <a:srgbClr val="000000"/>
                   </a:solidFill>
@@ -861,7 +862,7 @@
             </a:ln>
             <a:extLst>
               <a:ext uri="{91240B29-F687-4f45-9708-019B960494DF}">
-                <a14:hiddenLine xmlns="" xmlns:a14="http://schemas.microsoft.com/office/drawing/2010/main" w="9525">
+                <a14:hiddenLine xmlns:a14="http://schemas.microsoft.com/office/drawing/2010/main" xmlns="" w="9525">
                   <a:solidFill>
                     <a:srgbClr val="000000"/>
                   </a:solidFill>
@@ -895,7 +896,7 @@
             </a:ln>
             <a:extLst>
               <a:ext uri="{91240B29-F687-4f45-9708-019B960494DF}">
-                <a14:hiddenLine xmlns="" xmlns:a14="http://schemas.microsoft.com/office/drawing/2010/main" w="9525">
+                <a14:hiddenLine xmlns:a14="http://schemas.microsoft.com/office/drawing/2010/main" xmlns="" w="9525">
                   <a:solidFill>
                     <a:srgbClr val="000000"/>
                   </a:solidFill>
@@ -985,7 +986,7 @@
             </a:ln>
             <a:extLst>
               <a:ext uri="{91240B29-F687-4f45-9708-019B960494DF}">
-                <a14:hiddenLine xmlns="" xmlns:a14="http://schemas.microsoft.com/office/drawing/2010/main" w="9525">
+                <a14:hiddenLine xmlns:a14="http://schemas.microsoft.com/office/drawing/2010/main" xmlns="" w="9525">
                   <a:solidFill>
                     <a:srgbClr val="000000"/>
                   </a:solidFill>
@@ -1047,7 +1048,7 @@
             </a:ln>
             <a:extLst>
               <a:ext uri="{91240B29-F687-4f45-9708-019B960494DF}">
-                <a14:hiddenLine xmlns="" xmlns:a14="http://schemas.microsoft.com/office/drawing/2010/main" w="9525">
+                <a14:hiddenLine xmlns:a14="http://schemas.microsoft.com/office/drawing/2010/main" xmlns="" w="9525">
                   <a:solidFill>
                     <a:srgbClr val="000000"/>
                   </a:solidFill>
@@ -1109,7 +1110,7 @@
             </a:ln>
             <a:extLst>
               <a:ext uri="{91240B29-F687-4f45-9708-019B960494DF}">
-                <a14:hiddenLine xmlns="" xmlns:a14="http://schemas.microsoft.com/office/drawing/2010/main" w="9525">
+                <a14:hiddenLine xmlns:a14="http://schemas.microsoft.com/office/drawing/2010/main" xmlns="" w="9525">
                   <a:solidFill>
                     <a:srgbClr val="000000"/>
                   </a:solidFill>
@@ -1199,7 +1200,7 @@
             </a:ln>
             <a:extLst>
               <a:ext uri="{91240B29-F687-4f45-9708-019B960494DF}">
-                <a14:hiddenLine xmlns="" xmlns:a14="http://schemas.microsoft.com/office/drawing/2010/main" w="9525">
+                <a14:hiddenLine xmlns:a14="http://schemas.microsoft.com/office/drawing/2010/main" xmlns="" w="9525">
                   <a:solidFill>
                     <a:srgbClr val="000000"/>
                   </a:solidFill>
@@ -1261,7 +1262,7 @@
             </a:ln>
             <a:extLst>
               <a:ext uri="{91240B29-F687-4f45-9708-019B960494DF}">
-                <a14:hiddenLine xmlns="" xmlns:a14="http://schemas.microsoft.com/office/drawing/2010/main" w="9525">
+                <a14:hiddenLine xmlns:a14="http://schemas.microsoft.com/office/drawing/2010/main" xmlns="" w="9525">
                   <a:solidFill>
                     <a:srgbClr val="000000"/>
                   </a:solidFill>
@@ -1323,7 +1324,7 @@
             </a:ln>
             <a:extLst>
               <a:ext uri="{91240B29-F687-4f45-9708-019B960494DF}">
-                <a14:hiddenLine xmlns="" xmlns:a14="http://schemas.microsoft.com/office/drawing/2010/main" w="9525">
+                <a14:hiddenLine xmlns:a14="http://schemas.microsoft.com/office/drawing/2010/main" xmlns="" w="9525">
                   <a:solidFill>
                     <a:srgbClr val="000000"/>
                   </a:solidFill>
@@ -1413,7 +1414,7 @@
             </a:ln>
             <a:extLst>
               <a:ext uri="{91240B29-F687-4f45-9708-019B960494DF}">
-                <a14:hiddenLine xmlns="" xmlns:a14="http://schemas.microsoft.com/office/drawing/2010/main" w="9525">
+                <a14:hiddenLine xmlns:a14="http://schemas.microsoft.com/office/drawing/2010/main" xmlns="" w="9525">
                   <a:solidFill>
                     <a:srgbClr val="000000"/>
                   </a:solidFill>
@@ -1503,7 +1504,7 @@
             </a:ln>
             <a:extLst>
               <a:ext uri="{91240B29-F687-4f45-9708-019B960494DF}">
-                <a14:hiddenLine xmlns="" xmlns:a14="http://schemas.microsoft.com/office/drawing/2010/main" w="9525">
+                <a14:hiddenLine xmlns:a14="http://schemas.microsoft.com/office/drawing/2010/main" xmlns="" w="9525">
                   <a:solidFill>
                     <a:srgbClr val="000000"/>
                   </a:solidFill>
@@ -1565,7 +1566,7 @@
             </a:ln>
             <a:extLst>
               <a:ext uri="{91240B29-F687-4f45-9708-019B960494DF}">
-                <a14:hiddenLine xmlns="" xmlns:a14="http://schemas.microsoft.com/office/drawing/2010/main" w="9525">
+                <a14:hiddenLine xmlns:a14="http://schemas.microsoft.com/office/drawing/2010/main" xmlns="" w="9525">
                   <a:solidFill>
                     <a:srgbClr val="000000"/>
                   </a:solidFill>
@@ -1675,7 +1676,7 @@
             </a:ln>
             <a:extLst>
               <a:ext uri="{91240B29-F687-4f45-9708-019B960494DF}">
-                <a14:hiddenLine xmlns="" xmlns:a14="http://schemas.microsoft.com/office/drawing/2010/main" w="9525">
+                <a14:hiddenLine xmlns:a14="http://schemas.microsoft.com/office/drawing/2010/main" xmlns="" w="9525">
                   <a:solidFill>
                     <a:srgbClr val="000000"/>
                   </a:solidFill>
@@ -1737,7 +1738,7 @@
             </a:ln>
             <a:extLst>
               <a:ext uri="{91240B29-F687-4f45-9708-019B960494DF}">
-                <a14:hiddenLine xmlns="" xmlns:a14="http://schemas.microsoft.com/office/drawing/2010/main" w="9525">
+                <a14:hiddenLine xmlns:a14="http://schemas.microsoft.com/office/drawing/2010/main" xmlns="" w="9525">
                   <a:solidFill>
                     <a:srgbClr val="000000"/>
                   </a:solidFill>
@@ -1827,7 +1828,7 @@
             </a:ln>
             <a:extLst>
               <a:ext uri="{91240B29-F687-4f45-9708-019B960494DF}">
-                <a14:hiddenLine xmlns="" xmlns:a14="http://schemas.microsoft.com/office/drawing/2010/main" w="9525">
+                <a14:hiddenLine xmlns:a14="http://schemas.microsoft.com/office/drawing/2010/main" xmlns="" w="9525">
                   <a:solidFill>
                     <a:srgbClr val="000000"/>
                   </a:solidFill>
@@ -1917,7 +1918,7 @@
             </a:ln>
             <a:extLst>
               <a:ext uri="{91240B29-F687-4f45-9708-019B960494DF}">
-                <a14:hiddenLine xmlns="" xmlns:a14="http://schemas.microsoft.com/office/drawing/2010/main" w="9525">
+                <a14:hiddenLine xmlns:a14="http://schemas.microsoft.com/office/drawing/2010/main" xmlns="" w="9525">
                   <a:solidFill>
                     <a:srgbClr val="000000"/>
                   </a:solidFill>
@@ -1979,7 +1980,7 @@
             </a:ln>
             <a:extLst>
               <a:ext uri="{91240B29-F687-4f45-9708-019B960494DF}">
-                <a14:hiddenLine xmlns="" xmlns:a14="http://schemas.microsoft.com/office/drawing/2010/main" w="9525">
+                <a14:hiddenLine xmlns:a14="http://schemas.microsoft.com/office/drawing/2010/main" xmlns="" w="9525">
                   <a:solidFill>
                     <a:srgbClr val="000000"/>
                   </a:solidFill>
@@ -2069,7 +2070,7 @@
             </a:ln>
             <a:extLst>
               <a:ext uri="{91240B29-F687-4f45-9708-019B960494DF}">
-                <a14:hiddenLine xmlns="" xmlns:a14="http://schemas.microsoft.com/office/drawing/2010/main" w="9525">
+                <a14:hiddenLine xmlns:a14="http://schemas.microsoft.com/office/drawing/2010/main" xmlns="" w="9525">
                   <a:solidFill>
                     <a:srgbClr val="000000"/>
                   </a:solidFill>
@@ -2159,7 +2160,7 @@
             </a:ln>
             <a:extLst>
               <a:ext uri="{91240B29-F687-4f45-9708-019B960494DF}">
-                <a14:hiddenLine xmlns="" xmlns:a14="http://schemas.microsoft.com/office/drawing/2010/main" w="9525">
+                <a14:hiddenLine xmlns:a14="http://schemas.microsoft.com/office/drawing/2010/main" xmlns="" w="9525">
                   <a:solidFill>
                     <a:srgbClr val="000000"/>
                   </a:solidFill>
@@ -2215,7 +2216,7 @@
             </a:ln>
             <a:extLst>
               <a:ext uri="{91240B29-F687-4f45-9708-019B960494DF}">
-                <a14:hiddenLine xmlns="" xmlns:a14="http://schemas.microsoft.com/office/drawing/2010/main" w="9525">
+                <a14:hiddenLine xmlns:a14="http://schemas.microsoft.com/office/drawing/2010/main" xmlns="" w="9525">
                   <a:solidFill>
                     <a:srgbClr val="000000"/>
                   </a:solidFill>
@@ -2305,7 +2306,7 @@
             </a:ln>
             <a:extLst>
               <a:ext uri="{91240B29-F687-4f45-9708-019B960494DF}">
-                <a14:hiddenLine xmlns="" xmlns:a14="http://schemas.microsoft.com/office/drawing/2010/main" w="9525">
+                <a14:hiddenLine xmlns:a14="http://schemas.microsoft.com/office/drawing/2010/main" xmlns="" w="9525">
                   <a:solidFill>
                     <a:srgbClr val="000000"/>
                   </a:solidFill>
@@ -2361,7 +2362,7 @@
             </a:ln>
             <a:extLst>
               <a:ext uri="{91240B29-F687-4f45-9708-019B960494DF}">
-                <a14:hiddenLine xmlns="" xmlns:a14="http://schemas.microsoft.com/office/drawing/2010/main" w="9525">
+                <a14:hiddenLine xmlns:a14="http://schemas.microsoft.com/office/drawing/2010/main" xmlns="" w="9525">
                   <a:solidFill>
                     <a:srgbClr val="000000"/>
                   </a:solidFill>
@@ -2451,7 +2452,7 @@
             </a:ln>
             <a:extLst>
               <a:ext uri="{91240B29-F687-4f45-9708-019B960494DF}">
-                <a14:hiddenLine xmlns="" xmlns:a14="http://schemas.microsoft.com/office/drawing/2010/main" w="9525">
+                <a14:hiddenLine xmlns:a14="http://schemas.microsoft.com/office/drawing/2010/main" xmlns="" w="9525">
                   <a:solidFill>
                     <a:srgbClr val="000000"/>
                   </a:solidFill>
@@ -2519,7 +2520,7 @@
             </a:ln>
             <a:extLst>
               <a:ext uri="{91240B29-F687-4f45-9708-019B960494DF}">
-                <a14:hiddenLine xmlns="" xmlns:a14="http://schemas.microsoft.com/office/drawing/2010/main" w="9525">
+                <a14:hiddenLine xmlns:a14="http://schemas.microsoft.com/office/drawing/2010/main" xmlns="" w="9525">
                   <a:solidFill>
                     <a:srgbClr val="000000"/>
                   </a:solidFill>
@@ -2609,7 +2610,7 @@
             </a:ln>
             <a:extLst>
               <a:ext uri="{91240B29-F687-4f45-9708-019B960494DF}">
-                <a14:hiddenLine xmlns="" xmlns:a14="http://schemas.microsoft.com/office/drawing/2010/main" w="9525">
+                <a14:hiddenLine xmlns:a14="http://schemas.microsoft.com/office/drawing/2010/main" xmlns="" w="9525">
                   <a:solidFill>
                     <a:srgbClr val="000000"/>
                   </a:solidFill>
@@ -2677,7 +2678,7 @@
             </a:ln>
             <a:extLst>
               <a:ext uri="{91240B29-F687-4f45-9708-019B960494DF}">
-                <a14:hiddenLine xmlns="" xmlns:a14="http://schemas.microsoft.com/office/drawing/2010/main" w="9525">
+                <a14:hiddenLine xmlns:a14="http://schemas.microsoft.com/office/drawing/2010/main" xmlns="" w="9525">
                   <a:solidFill>
                     <a:srgbClr val="000000"/>
                   </a:solidFill>
@@ -2767,7 +2768,7 @@
             </a:ln>
             <a:extLst>
               <a:ext uri="{91240B29-F687-4f45-9708-019B960494DF}">
-                <a14:hiddenLine xmlns="" xmlns:a14="http://schemas.microsoft.com/office/drawing/2010/main" w="9525">
+                <a14:hiddenLine xmlns:a14="http://schemas.microsoft.com/office/drawing/2010/main" xmlns="" w="9525">
                   <a:solidFill>
                     <a:srgbClr val="000000"/>
                   </a:solidFill>
@@ -2801,7 +2802,7 @@
             </a:ln>
             <a:extLst>
               <a:ext uri="{91240B29-F687-4f45-9708-019B960494DF}">
-                <a14:hiddenLine xmlns="" xmlns:a14="http://schemas.microsoft.com/office/drawing/2010/main" w="9525">
+                <a14:hiddenLine xmlns:a14="http://schemas.microsoft.com/office/drawing/2010/main" xmlns="" w="9525">
                   <a:solidFill>
                     <a:srgbClr val="000000"/>
                   </a:solidFill>
@@ -2891,7 +2892,7 @@
             </a:ln>
             <a:extLst>
               <a:ext uri="{91240B29-F687-4f45-9708-019B960494DF}">
-                <a14:hiddenLine xmlns="" xmlns:a14="http://schemas.microsoft.com/office/drawing/2010/main" w="9525">
+                <a14:hiddenLine xmlns:a14="http://schemas.microsoft.com/office/drawing/2010/main" xmlns="" w="9525">
                   <a:solidFill>
                     <a:srgbClr val="000000"/>
                   </a:solidFill>
@@ -2953,7 +2954,7 @@
             </a:ln>
             <a:extLst>
               <a:ext uri="{91240B29-F687-4f45-9708-019B960494DF}">
-                <a14:hiddenLine xmlns="" xmlns:a14="http://schemas.microsoft.com/office/drawing/2010/main" w="9525">
+                <a14:hiddenLine xmlns:a14="http://schemas.microsoft.com/office/drawing/2010/main" xmlns="" w="9525">
                   <a:solidFill>
                     <a:srgbClr val="000000"/>
                   </a:solidFill>
@@ -3015,7 +3016,7 @@
             </a:ln>
             <a:extLst>
               <a:ext uri="{91240B29-F687-4f45-9708-019B960494DF}">
-                <a14:hiddenLine xmlns="" xmlns:a14="http://schemas.microsoft.com/office/drawing/2010/main" w="9525">
+                <a14:hiddenLine xmlns:a14="http://schemas.microsoft.com/office/drawing/2010/main" xmlns="" w="9525">
                   <a:solidFill>
                     <a:srgbClr val="000000"/>
                   </a:solidFill>
@@ -3105,7 +3106,7 @@
             </a:ln>
             <a:extLst>
               <a:ext uri="{91240B29-F687-4f45-9708-019B960494DF}">
-                <a14:hiddenLine xmlns="" xmlns:a14="http://schemas.microsoft.com/office/drawing/2010/main" w="9525">
+                <a14:hiddenLine xmlns:a14="http://schemas.microsoft.com/office/drawing/2010/main" xmlns="" w="9525">
                   <a:solidFill>
                     <a:srgbClr val="000000"/>
                   </a:solidFill>
@@ -3173,7 +3174,7 @@
             </a:ln>
             <a:extLst>
               <a:ext uri="{91240B29-F687-4f45-9708-019B960494DF}">
-                <a14:hiddenLine xmlns="" xmlns:a14="http://schemas.microsoft.com/office/drawing/2010/main" w="9525">
+                <a14:hiddenLine xmlns:a14="http://schemas.microsoft.com/office/drawing/2010/main" xmlns="" w="9525">
                   <a:solidFill>
                     <a:srgbClr val="000000"/>
                   </a:solidFill>
@@ -3235,7 +3236,7 @@
             </a:ln>
             <a:extLst>
               <a:ext uri="{91240B29-F687-4f45-9708-019B960494DF}">
-                <a14:hiddenLine xmlns="" xmlns:a14="http://schemas.microsoft.com/office/drawing/2010/main" w="9525">
+                <a14:hiddenLine xmlns:a14="http://schemas.microsoft.com/office/drawing/2010/main" xmlns="" w="9525">
                   <a:solidFill>
                     <a:srgbClr val="000000"/>
                   </a:solidFill>
@@ -3325,7 +3326,7 @@
             </a:ln>
             <a:extLst>
               <a:ext uri="{91240B29-F687-4f45-9708-019B960494DF}">
-                <a14:hiddenLine xmlns="" xmlns:a14="http://schemas.microsoft.com/office/drawing/2010/main" w="9525">
+                <a14:hiddenLine xmlns:a14="http://schemas.microsoft.com/office/drawing/2010/main" xmlns="" w="9525">
                   <a:solidFill>
                     <a:srgbClr val="000000"/>
                   </a:solidFill>
@@ -3387,7 +3388,7 @@
             </a:ln>
             <a:extLst>
               <a:ext uri="{91240B29-F687-4f45-9708-019B960494DF}">
-                <a14:hiddenLine xmlns="" xmlns:a14="http://schemas.microsoft.com/office/drawing/2010/main" w="9525">
+                <a14:hiddenLine xmlns:a14="http://schemas.microsoft.com/office/drawing/2010/main" xmlns="" w="9525">
                   <a:solidFill>
                     <a:srgbClr val="000000"/>
                   </a:solidFill>
@@ -3477,7 +3478,7 @@
             </a:ln>
             <a:extLst>
               <a:ext uri="{91240B29-F687-4f45-9708-019B960494DF}">
-                <a14:hiddenLine xmlns="" xmlns:a14="http://schemas.microsoft.com/office/drawing/2010/main" w="9525">
+                <a14:hiddenLine xmlns:a14="http://schemas.microsoft.com/office/drawing/2010/main" xmlns="" w="9525">
                   <a:solidFill>
                     <a:srgbClr val="000000"/>
                   </a:solidFill>
@@ -3539,7 +3540,7 @@
             </a:ln>
             <a:extLst>
               <a:ext uri="{91240B29-F687-4f45-9708-019B960494DF}">
-                <a14:hiddenLine xmlns="" xmlns:a14="http://schemas.microsoft.com/office/drawing/2010/main" w="9525">
+                <a14:hiddenLine xmlns:a14="http://schemas.microsoft.com/office/drawing/2010/main" xmlns="" w="9525">
                   <a:solidFill>
                     <a:srgbClr val="000000"/>
                   </a:solidFill>
@@ -3629,7 +3630,7 @@
             </a:ln>
             <a:extLst>
               <a:ext uri="{91240B29-F687-4f45-9708-019B960494DF}">
-                <a14:hiddenLine xmlns="" xmlns:a14="http://schemas.microsoft.com/office/drawing/2010/main" w="9525">
+                <a14:hiddenLine xmlns:a14="http://schemas.microsoft.com/office/drawing/2010/main" xmlns="" w="9525">
                   <a:solidFill>
                     <a:srgbClr val="000000"/>
                   </a:solidFill>
@@ -3663,7 +3664,7 @@
             </a:ln>
             <a:extLst>
               <a:ext uri="{91240B29-F687-4f45-9708-019B960494DF}">
-                <a14:hiddenLine xmlns="" xmlns:a14="http://schemas.microsoft.com/office/drawing/2010/main" w="9525">
+                <a14:hiddenLine xmlns:a14="http://schemas.microsoft.com/office/drawing/2010/main" xmlns="" w="9525">
                   <a:solidFill>
                     <a:srgbClr val="000000"/>
                   </a:solidFill>
@@ -3728,7 +3729,7 @@
             </a:ln>
             <a:extLst>
               <a:ext uri="{91240B29-F687-4f45-9708-019B960494DF}">
-                <a14:hiddenLine xmlns="" xmlns:a14="http://schemas.microsoft.com/office/drawing/2010/main" w="9525">
+                <a14:hiddenLine xmlns:a14="http://schemas.microsoft.com/office/drawing/2010/main" xmlns="" w="9525">
                   <a:solidFill>
                     <a:srgbClr val="000000"/>
                   </a:solidFill>
@@ -3818,7 +3819,7 @@
             </a:ln>
             <a:extLst>
               <a:ext uri="{91240B29-F687-4f45-9708-019B960494DF}">
-                <a14:hiddenLine xmlns="" xmlns:a14="http://schemas.microsoft.com/office/drawing/2010/main" w="9525">
+                <a14:hiddenLine xmlns:a14="http://schemas.microsoft.com/office/drawing/2010/main" xmlns="" w="9525">
                   <a:solidFill>
                     <a:srgbClr val="000000"/>
                   </a:solidFill>
@@ -3880,7 +3881,7 @@
             </a:ln>
             <a:extLst>
               <a:ext uri="{91240B29-F687-4f45-9708-019B960494DF}">
-                <a14:hiddenLine xmlns="" xmlns:a14="http://schemas.microsoft.com/office/drawing/2010/main" w="9525">
+                <a14:hiddenLine xmlns:a14="http://schemas.microsoft.com/office/drawing/2010/main" xmlns="" w="9525">
                   <a:solidFill>
                     <a:srgbClr val="000000"/>
                   </a:solidFill>
@@ -3970,7 +3971,7 @@
             </a:ln>
             <a:extLst>
               <a:ext uri="{91240B29-F687-4f45-9708-019B960494DF}">
-                <a14:hiddenLine xmlns="" xmlns:a14="http://schemas.microsoft.com/office/drawing/2010/main" w="9525">
+                <a14:hiddenLine xmlns:a14="http://schemas.microsoft.com/office/drawing/2010/main" xmlns="" w="9525">
                   <a:solidFill>
                     <a:srgbClr val="000000"/>
                   </a:solidFill>
@@ -4060,7 +4061,7 @@
             </a:ln>
             <a:extLst>
               <a:ext uri="{91240B29-F687-4f45-9708-019B960494DF}">
-                <a14:hiddenLine xmlns="" xmlns:a14="http://schemas.microsoft.com/office/drawing/2010/main" w="9525">
+                <a14:hiddenLine xmlns:a14="http://schemas.microsoft.com/office/drawing/2010/main" xmlns="" w="9525">
                   <a:solidFill>
                     <a:srgbClr val="000000"/>
                   </a:solidFill>
@@ -4125,7 +4126,7 @@
             </a:ln>
             <a:extLst>
               <a:ext uri="{91240B29-F687-4f45-9708-019B960494DF}">
-                <a14:hiddenLine xmlns="" xmlns:a14="http://schemas.microsoft.com/office/drawing/2010/main" w="9525">
+                <a14:hiddenLine xmlns:a14="http://schemas.microsoft.com/office/drawing/2010/main" xmlns="" w="9525">
                   <a:solidFill>
                     <a:srgbClr val="000000"/>
                   </a:solidFill>
@@ -4187,7 +4188,7 @@
             </a:ln>
             <a:extLst>
               <a:ext uri="{91240B29-F687-4f45-9708-019B960494DF}">
-                <a14:hiddenLine xmlns="" xmlns:a14="http://schemas.microsoft.com/office/drawing/2010/main" w="9525">
+                <a14:hiddenLine xmlns:a14="http://schemas.microsoft.com/office/drawing/2010/main" xmlns="" w="9525">
                   <a:solidFill>
                     <a:srgbClr val="000000"/>
                   </a:solidFill>
@@ -4277,7 +4278,7 @@
             </a:ln>
             <a:extLst>
               <a:ext uri="{91240B29-F687-4f45-9708-019B960494DF}">
-                <a14:hiddenLine xmlns="" xmlns:a14="http://schemas.microsoft.com/office/drawing/2010/main" w="9525">
+                <a14:hiddenLine xmlns:a14="http://schemas.microsoft.com/office/drawing/2010/main" xmlns="" w="9525">
                   <a:solidFill>
                     <a:srgbClr val="000000"/>
                   </a:solidFill>
@@ -4367,7 +4368,7 @@
             </a:ln>
             <a:extLst>
               <a:ext uri="{91240B29-F687-4f45-9708-019B960494DF}">
-                <a14:hiddenLine xmlns="" xmlns:a14="http://schemas.microsoft.com/office/drawing/2010/main" w="9525">
+                <a14:hiddenLine xmlns:a14="http://schemas.microsoft.com/office/drawing/2010/main" xmlns="" w="9525">
                   <a:solidFill>
                     <a:srgbClr val="000000"/>
                   </a:solidFill>
@@ -4429,7 +4430,7 @@
             </a:ln>
             <a:extLst>
               <a:ext uri="{91240B29-F687-4f45-9708-019B960494DF}">
-                <a14:hiddenLine xmlns="" xmlns:a14="http://schemas.microsoft.com/office/drawing/2010/main" w="9525">
+                <a14:hiddenLine xmlns:a14="http://schemas.microsoft.com/office/drawing/2010/main" xmlns="" w="9525">
                   <a:solidFill>
                     <a:srgbClr val="000000"/>
                   </a:solidFill>
@@ -4549,7 +4550,7 @@
             </a:ln>
             <a:extLst>
               <a:ext uri="{91240B29-F687-4f45-9708-019B960494DF}">
-                <a14:hiddenLine xmlns="" xmlns:a14="http://schemas.microsoft.com/office/drawing/2010/main" w="9525">
+                <a14:hiddenLine xmlns:a14="http://schemas.microsoft.com/office/drawing/2010/main" xmlns="" w="9525">
                   <a:solidFill>
                     <a:srgbClr val="000000"/>
                   </a:solidFill>
@@ -4617,7 +4618,7 @@
             </a:ln>
             <a:extLst>
               <a:ext uri="{91240B29-F687-4f45-9708-019B960494DF}">
-                <a14:hiddenLine xmlns="" xmlns:a14="http://schemas.microsoft.com/office/drawing/2010/main" w="9525">
+                <a14:hiddenLine xmlns:a14="http://schemas.microsoft.com/office/drawing/2010/main" xmlns="" w="9525">
                   <a:solidFill>
                     <a:srgbClr val="000000"/>
                   </a:solidFill>
@@ -4707,7 +4708,7 @@
             </a:ln>
             <a:extLst>
               <a:ext uri="{91240B29-F687-4f45-9708-019B960494DF}">
-                <a14:hiddenLine xmlns="" xmlns:a14="http://schemas.microsoft.com/office/drawing/2010/main" w="9525">
+                <a14:hiddenLine xmlns:a14="http://schemas.microsoft.com/office/drawing/2010/main" xmlns="" w="9525">
                   <a:solidFill>
                     <a:srgbClr val="000000"/>
                   </a:solidFill>
@@ -4847,7 +4848,7 @@
           <a:p>
             <a:fld id="{EC4347D3-4C9A-C240-8F14-750059DFEEB0}" type="datetimeFigureOut">
               <a:rPr lang="en-US" smtClean="0"/>
-              <a:t>4/7/25</a:t>
+              <a:t>4/9/25</a:t>
             </a:fld>
             <a:endParaRPr lang="en-US"/>
           </a:p>
@@ -5114,7 +5115,7 @@
           <a:p>
             <a:fld id="{EC4347D3-4C9A-C240-8F14-750059DFEEB0}" type="datetimeFigureOut">
               <a:rPr lang="en-US" smtClean="0"/>
-              <a:t>4/7/25</a:t>
+              <a:t>4/9/25</a:t>
             </a:fld>
             <a:endParaRPr lang="en-US"/>
           </a:p>
@@ -5310,7 +5311,7 @@
           <a:p>
             <a:fld id="{EC4347D3-4C9A-C240-8F14-750059DFEEB0}" type="datetimeFigureOut">
               <a:rPr lang="en-US" smtClean="0"/>
-              <a:t>4/7/25</a:t>
+              <a:t>4/9/25</a:t>
             </a:fld>
             <a:endParaRPr lang="en-US"/>
           </a:p>
@@ -5573,7 +5574,7 @@
           <a:p>
             <a:fld id="{EC4347D3-4C9A-C240-8F14-750059DFEEB0}" type="datetimeFigureOut">
               <a:rPr lang="en-US" smtClean="0"/>
-              <a:t>4/7/25</a:t>
+              <a:t>4/9/25</a:t>
             </a:fld>
             <a:endParaRPr lang="en-US"/>
           </a:p>
@@ -6007,7 +6008,7 @@
           <a:p>
             <a:fld id="{EC4347D3-4C9A-C240-8F14-750059DFEEB0}" type="datetimeFigureOut">
               <a:rPr lang="en-US" smtClean="0"/>
-              <a:t>4/7/25</a:t>
+              <a:t>4/9/25</a:t>
             </a:fld>
             <a:endParaRPr lang="en-US"/>
           </a:p>
@@ -6553,7 +6554,7 @@
           <a:p>
             <a:fld id="{EC4347D3-4C9A-C240-8F14-750059DFEEB0}" type="datetimeFigureOut">
               <a:rPr lang="en-US" smtClean="0"/>
-              <a:t>4/7/25</a:t>
+              <a:t>4/9/25</a:t>
             </a:fld>
             <a:endParaRPr lang="en-US"/>
           </a:p>
@@ -7273,7 +7274,7 @@
           <a:p>
             <a:fld id="{EC4347D3-4C9A-C240-8F14-750059DFEEB0}" type="datetimeFigureOut">
               <a:rPr lang="en-US" smtClean="0"/>
-              <a:t>4/7/25</a:t>
+              <a:t>4/9/25</a:t>
             </a:fld>
             <a:endParaRPr lang="en-US"/>
           </a:p>
@@ -7443,7 +7444,7 @@
           <a:p>
             <a:fld id="{EC4347D3-4C9A-C240-8F14-750059DFEEB0}" type="datetimeFigureOut">
               <a:rPr lang="en-US" smtClean="0"/>
-              <a:t>4/7/25</a:t>
+              <a:t>4/9/25</a:t>
             </a:fld>
             <a:endParaRPr lang="en-US"/>
           </a:p>
@@ -7623,7 +7624,7 @@
           <a:p>
             <a:fld id="{EC4347D3-4C9A-C240-8F14-750059DFEEB0}" type="datetimeFigureOut">
               <a:rPr lang="en-US" smtClean="0"/>
-              <a:t>4/7/25</a:t>
+              <a:t>4/9/25</a:t>
             </a:fld>
             <a:endParaRPr lang="en-US"/>
           </a:p>
@@ -7793,7 +7794,7 @@
           <a:p>
             <a:fld id="{EC4347D3-4C9A-C240-8F14-750059DFEEB0}" type="datetimeFigureOut">
               <a:rPr lang="en-US" smtClean="0"/>
-              <a:t>4/7/25</a:t>
+              <a:t>4/9/25</a:t>
             </a:fld>
             <a:endParaRPr lang="en-US"/>
           </a:p>
@@ -8043,7 +8044,7 @@
           <a:p>
             <a:fld id="{EC4347D3-4C9A-C240-8F14-750059DFEEB0}" type="datetimeFigureOut">
               <a:rPr lang="en-US" smtClean="0"/>
-              <a:t>4/7/25</a:t>
+              <a:t>4/9/25</a:t>
             </a:fld>
             <a:endParaRPr lang="en-US"/>
           </a:p>
@@ -8275,7 +8276,7 @@
           <a:p>
             <a:fld id="{EC4347D3-4C9A-C240-8F14-750059DFEEB0}" type="datetimeFigureOut">
               <a:rPr lang="en-US" smtClean="0"/>
-              <a:t>4/7/25</a:t>
+              <a:t>4/9/25</a:t>
             </a:fld>
             <a:endParaRPr lang="en-US"/>
           </a:p>
@@ -8661,7 +8662,7 @@
           <a:p>
             <a:fld id="{EC4347D3-4C9A-C240-8F14-750059DFEEB0}" type="datetimeFigureOut">
               <a:rPr lang="en-US" smtClean="0"/>
-              <a:t>4/7/25</a:t>
+              <a:t>4/9/25</a:t>
             </a:fld>
             <a:endParaRPr lang="en-US"/>
           </a:p>
@@ -8784,7 +8785,7 @@
           <a:p>
             <a:fld id="{EC4347D3-4C9A-C240-8F14-750059DFEEB0}" type="datetimeFigureOut">
               <a:rPr lang="en-US" smtClean="0"/>
-              <a:t>4/7/25</a:t>
+              <a:t>4/9/25</a:t>
             </a:fld>
             <a:endParaRPr lang="en-US"/>
           </a:p>
@@ -8879,7 +8880,7 @@
           <a:p>
             <a:fld id="{EC4347D3-4C9A-C240-8F14-750059DFEEB0}" type="datetimeFigureOut">
               <a:rPr lang="en-US" smtClean="0"/>
-              <a:t>4/7/25</a:t>
+              <a:t>4/9/25</a:t>
             </a:fld>
             <a:endParaRPr lang="en-US"/>
           </a:p>
@@ -9128,7 +9129,7 @@
           <a:p>
             <a:fld id="{EC4347D3-4C9A-C240-8F14-750059DFEEB0}" type="datetimeFigureOut">
               <a:rPr lang="en-US" smtClean="0"/>
-              <a:t>4/7/25</a:t>
+              <a:t>4/9/25</a:t>
             </a:fld>
             <a:endParaRPr lang="en-US"/>
           </a:p>
@@ -9413,7 +9414,7 @@
           <a:p>
             <a:fld id="{EC4347D3-4C9A-C240-8F14-750059DFEEB0}" type="datetimeFigureOut">
               <a:rPr lang="en-US" smtClean="0"/>
-              <a:t>4/7/25</a:t>
+              <a:t>4/9/25</a:t>
             </a:fld>
             <a:endParaRPr lang="en-US"/>
           </a:p>
@@ -9536,7 +9537,7 @@
           <a:noFill/>
           <a:extLst>
             <a:ext uri="{909E8E84-426E-40dd-AFC4-6F175D3DCCD1}">
-              <a14:hiddenFill xmlns="" xmlns:a14="http://schemas.microsoft.com/office/drawing/2010/main">
+              <a14:hiddenFill xmlns:a14="http://schemas.microsoft.com/office/drawing/2010/main" xmlns="">
                 <a:solidFill>
                   <a:srgbClr val="FFFFFF"/>
                 </a:solidFill>
@@ -9610,7 +9611,7 @@
               </a:ln>
               <a:extLst>
                 <a:ext uri="{91240B29-F687-4f45-9708-019B960494DF}">
-                  <a14:hiddenLine xmlns="" xmlns:a14="http://schemas.microsoft.com/office/drawing/2010/main" w="9525">
+                  <a14:hiddenLine xmlns:a14="http://schemas.microsoft.com/office/drawing/2010/main" xmlns="" w="9525">
                     <a:solidFill>
                       <a:srgbClr val="000000"/>
                     </a:solidFill>
@@ -9700,7 +9701,7 @@
               </a:ln>
               <a:extLst>
                 <a:ext uri="{91240B29-F687-4f45-9708-019B960494DF}">
-                  <a14:hiddenLine xmlns="" xmlns:a14="http://schemas.microsoft.com/office/drawing/2010/main" w="9525">
+                  <a14:hiddenLine xmlns:a14="http://schemas.microsoft.com/office/drawing/2010/main" xmlns="" w="9525">
                     <a:solidFill>
                       <a:srgbClr val="000000"/>
                     </a:solidFill>
@@ -9790,7 +9791,7 @@
               </a:ln>
               <a:extLst>
                 <a:ext uri="{91240B29-F687-4f45-9708-019B960494DF}">
-                  <a14:hiddenLine xmlns="" xmlns:a14="http://schemas.microsoft.com/office/drawing/2010/main" w="9525">
+                  <a14:hiddenLine xmlns:a14="http://schemas.microsoft.com/office/drawing/2010/main" xmlns="" w="9525">
                     <a:solidFill>
                       <a:srgbClr val="000000"/>
                     </a:solidFill>
@@ -9852,7 +9853,7 @@
               </a:ln>
               <a:extLst>
                 <a:ext uri="{91240B29-F687-4f45-9708-019B960494DF}">
-                  <a14:hiddenLine xmlns="" xmlns:a14="http://schemas.microsoft.com/office/drawing/2010/main" w="9525">
+                  <a14:hiddenLine xmlns:a14="http://schemas.microsoft.com/office/drawing/2010/main" xmlns="" w="9525">
                     <a:solidFill>
                       <a:srgbClr val="000000"/>
                     </a:solidFill>
@@ -9942,7 +9943,7 @@
               </a:ln>
               <a:extLst>
                 <a:ext uri="{91240B29-F687-4f45-9708-019B960494DF}">
-                  <a14:hiddenLine xmlns="" xmlns:a14="http://schemas.microsoft.com/office/drawing/2010/main" w="9525">
+                  <a14:hiddenLine xmlns:a14="http://schemas.microsoft.com/office/drawing/2010/main" xmlns="" w="9525">
                     <a:solidFill>
                       <a:srgbClr val="000000"/>
                     </a:solidFill>
@@ -10004,7 +10005,7 @@
               </a:ln>
               <a:extLst>
                 <a:ext uri="{91240B29-F687-4f45-9708-019B960494DF}">
-                  <a14:hiddenLine xmlns="" xmlns:a14="http://schemas.microsoft.com/office/drawing/2010/main" w="9525">
+                  <a14:hiddenLine xmlns:a14="http://schemas.microsoft.com/office/drawing/2010/main" xmlns="" w="9525">
                     <a:solidFill>
                       <a:srgbClr val="000000"/>
                     </a:solidFill>
@@ -10066,7 +10067,7 @@
               </a:ln>
               <a:extLst>
                 <a:ext uri="{91240B29-F687-4f45-9708-019B960494DF}">
-                  <a14:hiddenLine xmlns="" xmlns:a14="http://schemas.microsoft.com/office/drawing/2010/main" w="9525">
+                  <a14:hiddenLine xmlns:a14="http://schemas.microsoft.com/office/drawing/2010/main" xmlns="" w="9525">
                     <a:solidFill>
                       <a:srgbClr val="000000"/>
                     </a:solidFill>
@@ -10156,7 +10157,7 @@
               </a:ln>
               <a:extLst>
                 <a:ext uri="{91240B29-F687-4f45-9708-019B960494DF}">
-                  <a14:hiddenLine xmlns="" xmlns:a14="http://schemas.microsoft.com/office/drawing/2010/main" w="9525">
+                  <a14:hiddenLine xmlns:a14="http://schemas.microsoft.com/office/drawing/2010/main" xmlns="" w="9525">
                     <a:solidFill>
                       <a:srgbClr val="000000"/>
                     </a:solidFill>
@@ -10246,7 +10247,7 @@
               </a:ln>
               <a:extLst>
                 <a:ext uri="{91240B29-F687-4f45-9708-019B960494DF}">
-                  <a14:hiddenLine xmlns="" xmlns:a14="http://schemas.microsoft.com/office/drawing/2010/main" w="9525">
+                  <a14:hiddenLine xmlns:a14="http://schemas.microsoft.com/office/drawing/2010/main" xmlns="" w="9525">
                     <a:solidFill>
                       <a:srgbClr val="000000"/>
                     </a:solidFill>
@@ -10308,7 +10309,7 @@
               </a:ln>
               <a:extLst>
                 <a:ext uri="{91240B29-F687-4f45-9708-019B960494DF}">
-                  <a14:hiddenLine xmlns="" xmlns:a14="http://schemas.microsoft.com/office/drawing/2010/main" w="9525">
+                  <a14:hiddenLine xmlns:a14="http://schemas.microsoft.com/office/drawing/2010/main" xmlns="" w="9525">
                     <a:solidFill>
                       <a:srgbClr val="000000"/>
                     </a:solidFill>
@@ -10418,7 +10419,7 @@
               </a:ln>
               <a:extLst>
                 <a:ext uri="{91240B29-F687-4f45-9708-019B960494DF}">
-                  <a14:hiddenLine xmlns="" xmlns:a14="http://schemas.microsoft.com/office/drawing/2010/main" w="9525">
+                  <a14:hiddenLine xmlns:a14="http://schemas.microsoft.com/office/drawing/2010/main" xmlns="" w="9525">
                     <a:solidFill>
                       <a:srgbClr val="000000"/>
                     </a:solidFill>
@@ -10502,7 +10503,7 @@
               </a:ln>
               <a:extLst>
                 <a:ext uri="{91240B29-F687-4f45-9708-019B960494DF}">
-                  <a14:hiddenLine xmlns="" xmlns:a14="http://schemas.microsoft.com/office/drawing/2010/main" w="9525">
+                  <a14:hiddenLine xmlns:a14="http://schemas.microsoft.com/office/drawing/2010/main" xmlns="" w="9525">
                     <a:solidFill>
                       <a:srgbClr val="000000"/>
                     </a:solidFill>
@@ -10564,7 +10565,7 @@
               </a:ln>
               <a:extLst>
                 <a:ext uri="{91240B29-F687-4f45-9708-019B960494DF}">
-                  <a14:hiddenLine xmlns="" xmlns:a14="http://schemas.microsoft.com/office/drawing/2010/main" w="9525">
+                  <a14:hiddenLine xmlns:a14="http://schemas.microsoft.com/office/drawing/2010/main" xmlns="" w="9525">
                     <a:solidFill>
                       <a:srgbClr val="000000"/>
                     </a:solidFill>
@@ -10626,7 +10627,7 @@
               </a:ln>
               <a:extLst>
                 <a:ext uri="{91240B29-F687-4f45-9708-019B960494DF}">
-                  <a14:hiddenLine xmlns="" xmlns:a14="http://schemas.microsoft.com/office/drawing/2010/main" w="9525">
+                  <a14:hiddenLine xmlns:a14="http://schemas.microsoft.com/office/drawing/2010/main" xmlns="" w="9525">
                     <a:solidFill>
                       <a:srgbClr val="000000"/>
                     </a:solidFill>
@@ -10716,7 +10717,7 @@
               </a:ln>
               <a:extLst>
                 <a:ext uri="{91240B29-F687-4f45-9708-019B960494DF}">
-                  <a14:hiddenLine xmlns="" xmlns:a14="http://schemas.microsoft.com/office/drawing/2010/main" w="9525">
+                  <a14:hiddenLine xmlns:a14="http://schemas.microsoft.com/office/drawing/2010/main" xmlns="" w="9525">
                     <a:solidFill>
                       <a:srgbClr val="000000"/>
                     </a:solidFill>
@@ -10750,7 +10751,7 @@
               </a:ln>
               <a:extLst>
                 <a:ext uri="{91240B29-F687-4f45-9708-019B960494DF}">
-                  <a14:hiddenLine xmlns="" xmlns:a14="http://schemas.microsoft.com/office/drawing/2010/main" w="9525">
+                  <a14:hiddenLine xmlns:a14="http://schemas.microsoft.com/office/drawing/2010/main" xmlns="" w="9525">
                     <a:solidFill>
                       <a:srgbClr val="000000"/>
                     </a:solidFill>
@@ -10815,7 +10816,7 @@
               </a:ln>
               <a:extLst>
                 <a:ext uri="{91240B29-F687-4f45-9708-019B960494DF}">
-                  <a14:hiddenLine xmlns="" xmlns:a14="http://schemas.microsoft.com/office/drawing/2010/main" w="9525">
+                  <a14:hiddenLine xmlns:a14="http://schemas.microsoft.com/office/drawing/2010/main" xmlns="" w="9525">
                     <a:solidFill>
                       <a:srgbClr val="000000"/>
                     </a:solidFill>
@@ -10905,7 +10906,7 @@
               </a:ln>
               <a:extLst>
                 <a:ext uri="{91240B29-F687-4f45-9708-019B960494DF}">
-                  <a14:hiddenLine xmlns="" xmlns:a14="http://schemas.microsoft.com/office/drawing/2010/main" w="9525">
+                  <a14:hiddenLine xmlns:a14="http://schemas.microsoft.com/office/drawing/2010/main" xmlns="" w="9525">
                     <a:solidFill>
                       <a:srgbClr val="000000"/>
                     </a:solidFill>
@@ -10967,7 +10968,7 @@
               </a:ln>
               <a:extLst>
                 <a:ext uri="{91240B29-F687-4f45-9708-019B960494DF}">
-                  <a14:hiddenLine xmlns="" xmlns:a14="http://schemas.microsoft.com/office/drawing/2010/main" w="9525">
+                  <a14:hiddenLine xmlns:a14="http://schemas.microsoft.com/office/drawing/2010/main" xmlns="" w="9525">
                     <a:solidFill>
                       <a:srgbClr val="000000"/>
                     </a:solidFill>
@@ -11057,7 +11058,7 @@
               </a:ln>
               <a:extLst>
                 <a:ext uri="{91240B29-F687-4f45-9708-019B960494DF}">
-                  <a14:hiddenLine xmlns="" xmlns:a14="http://schemas.microsoft.com/office/drawing/2010/main" w="9525">
+                  <a14:hiddenLine xmlns:a14="http://schemas.microsoft.com/office/drawing/2010/main" xmlns="" w="9525">
                     <a:solidFill>
                       <a:srgbClr val="000000"/>
                     </a:solidFill>
@@ -11122,7 +11123,7 @@
               </a:ln>
               <a:extLst>
                 <a:ext uri="{91240B29-F687-4f45-9708-019B960494DF}">
-                  <a14:hiddenLine xmlns="" xmlns:a14="http://schemas.microsoft.com/office/drawing/2010/main" w="9525">
+                  <a14:hiddenLine xmlns:a14="http://schemas.microsoft.com/office/drawing/2010/main" xmlns="" w="9525">
                     <a:solidFill>
                       <a:srgbClr val="000000"/>
                     </a:solidFill>
@@ -11184,7 +11185,7 @@
               </a:ln>
               <a:extLst>
                 <a:ext uri="{91240B29-F687-4f45-9708-019B960494DF}">
-                  <a14:hiddenLine xmlns="" xmlns:a14="http://schemas.microsoft.com/office/drawing/2010/main" w="9525">
+                  <a14:hiddenLine xmlns:a14="http://schemas.microsoft.com/office/drawing/2010/main" xmlns="" w="9525">
                     <a:solidFill>
                       <a:srgbClr val="000000"/>
                     </a:solidFill>
@@ -11274,7 +11275,7 @@
               </a:ln>
               <a:extLst>
                 <a:ext uri="{91240B29-F687-4f45-9708-019B960494DF}">
-                  <a14:hiddenLine xmlns="" xmlns:a14="http://schemas.microsoft.com/office/drawing/2010/main" w="9525">
+                  <a14:hiddenLine xmlns:a14="http://schemas.microsoft.com/office/drawing/2010/main" xmlns="" w="9525">
                     <a:solidFill>
                       <a:srgbClr val="000000"/>
                     </a:solidFill>
@@ -11364,7 +11365,7 @@
               </a:ln>
               <a:extLst>
                 <a:ext uri="{91240B29-F687-4f45-9708-019B960494DF}">
-                  <a14:hiddenLine xmlns="" xmlns:a14="http://schemas.microsoft.com/office/drawing/2010/main" w="9525">
+                  <a14:hiddenLine xmlns:a14="http://schemas.microsoft.com/office/drawing/2010/main" xmlns="" w="9525">
                     <a:solidFill>
                       <a:srgbClr val="000000"/>
                     </a:solidFill>
@@ -11429,7 +11430,7 @@
               </a:ln>
               <a:extLst>
                 <a:ext uri="{91240B29-F687-4f45-9708-019B960494DF}">
-                  <a14:hiddenLine xmlns="" xmlns:a14="http://schemas.microsoft.com/office/drawing/2010/main" w="9525">
+                  <a14:hiddenLine xmlns:a14="http://schemas.microsoft.com/office/drawing/2010/main" xmlns="" w="9525">
                     <a:solidFill>
                       <a:srgbClr val="000000"/>
                     </a:solidFill>
@@ -11549,7 +11550,7 @@
               </a:ln>
               <a:extLst>
                 <a:ext uri="{91240B29-F687-4f45-9708-019B960494DF}">
-                  <a14:hiddenLine xmlns="" xmlns:a14="http://schemas.microsoft.com/office/drawing/2010/main" w="9525">
+                  <a14:hiddenLine xmlns:a14="http://schemas.microsoft.com/office/drawing/2010/main" xmlns="" w="9525">
                     <a:solidFill>
                       <a:srgbClr val="000000"/>
                     </a:solidFill>
@@ -11630,7 +11631,7 @@
               </a:ln>
               <a:extLst>
                 <a:ext uri="{91240B29-F687-4f45-9708-019B960494DF}">
-                  <a14:hiddenLine xmlns="" xmlns:a14="http://schemas.microsoft.com/office/drawing/2010/main" w="9525">
+                  <a14:hiddenLine xmlns:a14="http://schemas.microsoft.com/office/drawing/2010/main" xmlns="" w="9525">
                     <a:solidFill>
                       <a:srgbClr val="000000"/>
                     </a:solidFill>
@@ -11745,7 +11746,7 @@
               </a:ln>
               <a:extLst>
                 <a:ext uri="{91240B29-F687-4f45-9708-019B960494DF}">
-                  <a14:hiddenLine xmlns="" xmlns:a14="http://schemas.microsoft.com/office/drawing/2010/main" w="9525">
+                  <a14:hiddenLine xmlns:a14="http://schemas.microsoft.com/office/drawing/2010/main" xmlns="" w="9525">
                     <a:solidFill>
                       <a:srgbClr val="000000"/>
                     </a:solidFill>
@@ -11835,7 +11836,7 @@
               </a:ln>
               <a:extLst>
                 <a:ext uri="{91240B29-F687-4f45-9708-019B960494DF}">
-                  <a14:hiddenLine xmlns="" xmlns:a14="http://schemas.microsoft.com/office/drawing/2010/main" w="9525">
+                  <a14:hiddenLine xmlns:a14="http://schemas.microsoft.com/office/drawing/2010/main" xmlns="" w="9525">
                     <a:solidFill>
                       <a:srgbClr val="000000"/>
                     </a:solidFill>
@@ -11900,7 +11901,7 @@
               </a:ln>
               <a:extLst>
                 <a:ext uri="{91240B29-F687-4f45-9708-019B960494DF}">
-                  <a14:hiddenLine xmlns="" xmlns:a14="http://schemas.microsoft.com/office/drawing/2010/main" w="9525">
+                  <a14:hiddenLine xmlns:a14="http://schemas.microsoft.com/office/drawing/2010/main" xmlns="" w="9525">
                     <a:solidFill>
                       <a:srgbClr val="000000"/>
                     </a:solidFill>
@@ -11990,7 +11991,7 @@
               </a:ln>
               <a:extLst>
                 <a:ext uri="{91240B29-F687-4f45-9708-019B960494DF}">
-                  <a14:hiddenLine xmlns="" xmlns:a14="http://schemas.microsoft.com/office/drawing/2010/main" w="9525">
+                  <a14:hiddenLine xmlns:a14="http://schemas.microsoft.com/office/drawing/2010/main" xmlns="" w="9525">
                     <a:solidFill>
                       <a:srgbClr val="000000"/>
                     </a:solidFill>
@@ -12058,7 +12059,7 @@
               </a:ln>
               <a:extLst>
                 <a:ext uri="{91240B29-F687-4f45-9708-019B960494DF}">
-                  <a14:hiddenLine xmlns="" xmlns:a14="http://schemas.microsoft.com/office/drawing/2010/main" w="9525">
+                  <a14:hiddenLine xmlns:a14="http://schemas.microsoft.com/office/drawing/2010/main" xmlns="" w="9525">
                     <a:solidFill>
                       <a:srgbClr val="000000"/>
                     </a:solidFill>
@@ -12148,7 +12149,7 @@
               </a:ln>
               <a:extLst>
                 <a:ext uri="{91240B29-F687-4f45-9708-019B960494DF}">
-                  <a14:hiddenLine xmlns="" xmlns:a14="http://schemas.microsoft.com/office/drawing/2010/main" w="9525">
+                  <a14:hiddenLine xmlns:a14="http://schemas.microsoft.com/office/drawing/2010/main" xmlns="" w="9525">
                     <a:solidFill>
                       <a:srgbClr val="000000"/>
                     </a:solidFill>
@@ -12216,7 +12217,7 @@
               </a:ln>
               <a:extLst>
                 <a:ext uri="{91240B29-F687-4f45-9708-019B960494DF}">
-                  <a14:hiddenLine xmlns="" xmlns:a14="http://schemas.microsoft.com/office/drawing/2010/main" w="9525">
+                  <a14:hiddenLine xmlns:a14="http://schemas.microsoft.com/office/drawing/2010/main" xmlns="" w="9525">
                     <a:solidFill>
                       <a:srgbClr val="000000"/>
                     </a:solidFill>
@@ -12306,7 +12307,7 @@
               </a:ln>
               <a:extLst>
                 <a:ext uri="{91240B29-F687-4f45-9708-019B960494DF}">
-                  <a14:hiddenLine xmlns="" xmlns:a14="http://schemas.microsoft.com/office/drawing/2010/main" w="9525">
+                  <a14:hiddenLine xmlns:a14="http://schemas.microsoft.com/office/drawing/2010/main" xmlns="" w="9525">
                     <a:solidFill>
                       <a:srgbClr val="000000"/>
                     </a:solidFill>
@@ -12340,7 +12341,7 @@
               </a:ln>
               <a:extLst>
                 <a:ext uri="{91240B29-F687-4f45-9708-019B960494DF}">
-                  <a14:hiddenLine xmlns="" xmlns:a14="http://schemas.microsoft.com/office/drawing/2010/main" w="9525">
+                  <a14:hiddenLine xmlns:a14="http://schemas.microsoft.com/office/drawing/2010/main" xmlns="" w="9525">
                     <a:solidFill>
                       <a:srgbClr val="000000"/>
                     </a:solidFill>
@@ -12480,7 +12481,7 @@
           <a:p>
             <a:fld id="{EC4347D3-4C9A-C240-8F14-750059DFEEB0}" type="datetimeFigureOut">
               <a:rPr lang="en-US" smtClean="0"/>
-              <a:t>4/7/25</a:t>
+              <a:t>4/9/25</a:t>
             </a:fld>
             <a:endParaRPr lang="en-US"/>
           </a:p>
@@ -14422,6 +14423,167 @@
 </p:sld>
 </file>
 
+<file path=ppt/slides/slide19.xml><?xml version="1.0" encoding="utf-8"?>
+<p:sld xmlns:a="http://schemas.openxmlformats.org/drawingml/2006/main" xmlns:r="http://schemas.openxmlformats.org/officeDocument/2006/relationships" xmlns:p="http://schemas.openxmlformats.org/presentationml/2006/main">
+  <p:cSld>
+    <p:spTree>
+      <p:nvGrpSpPr>
+        <p:cNvPr id="1" name=""/>
+        <p:cNvGrpSpPr/>
+        <p:nvPr/>
+      </p:nvGrpSpPr>
+      <p:grpSpPr>
+        <a:xfrm>
+          <a:off x="0" y="0"/>
+          <a:ext cx="0" cy="0"/>
+          <a:chOff x="0" y="0"/>
+          <a:chExt cx="0" cy="0"/>
+        </a:xfrm>
+      </p:grpSpPr>
+      <p:sp>
+        <p:nvSpPr>
+          <p:cNvPr id="6146" name="Rectangle 2"/>
+          <p:cNvSpPr>
+            <a:spLocks noGrp="1" noChangeArrowheads="1"/>
+          </p:cNvSpPr>
+          <p:nvPr>
+            <p:ph type="title"/>
+            <p:custDataLst>
+              <p:tags r:id="rId1"/>
+            </p:custDataLst>
+          </p:nvPr>
+        </p:nvSpPr>
+        <p:spPr>
+          <a:xfrm>
+            <a:off x="1141413" y="284084"/>
+            <a:ext cx="9905998" cy="620791"/>
+          </a:xfrm>
+        </p:spPr>
+        <p:txBody>
+          <a:bodyPr/>
+          <a:lstStyle/>
+          <a:p>
+            <a:pPr algn="ctr"/>
+            <a:r>
+              <a:rPr lang="en-US" dirty="0"/>
+              <a:t>Lecture 21: 4/9/25</a:t>
+            </a:r>
+          </a:p>
+        </p:txBody>
+      </p:sp>
+      <p:sp>
+        <p:nvSpPr>
+          <p:cNvPr id="6147" name="Rectangle 3"/>
+          <p:cNvSpPr>
+            <a:spLocks noGrp="1" noChangeArrowheads="1"/>
+          </p:cNvSpPr>
+          <p:nvPr>
+            <p:ph idx="1"/>
+            <p:custDataLst>
+              <p:tags r:id="rId2"/>
+            </p:custDataLst>
+          </p:nvPr>
+        </p:nvSpPr>
+        <p:spPr>
+          <a:xfrm>
+            <a:off x="1021404" y="1054500"/>
+            <a:ext cx="10204315" cy="5346298"/>
+          </a:xfrm>
+        </p:spPr>
+        <p:txBody>
+          <a:bodyPr>
+            <a:normAutofit lnSpcReduction="10000"/>
+          </a:bodyPr>
+          <a:lstStyle/>
+          <a:p>
+            <a:r>
+              <a:rPr lang="en-US" dirty="0"/>
+              <a:t>There are THREE more lectures (that includes today).</a:t>
+            </a:r>
+          </a:p>
+          <a:p>
+            <a:pPr lvl="1"/>
+            <a:r>
+              <a:rPr lang="en-US" dirty="0"/>
+              <a:t>Second Quiz and Final project immediately after that</a:t>
+            </a:r>
+          </a:p>
+          <a:p>
+            <a:r>
+              <a:rPr lang="en-US" dirty="0"/>
+              <a:t>Cows homework almost done. Avg. was 8.4 so don’t feel bad if you had trouble getting full credit. It was tougher than I expected!</a:t>
+            </a:r>
+          </a:p>
+          <a:p>
+            <a:r>
+              <a:rPr lang="en-US" dirty="0"/>
+              <a:t>VEB Trees Homework releases this Friday! Last One!</a:t>
+            </a:r>
+          </a:p>
+          <a:p>
+            <a:pPr lvl="1"/>
+            <a:r>
+              <a:rPr lang="en-US" dirty="0"/>
+              <a:t>I’ll comment on this upcoming homework after we finish VEB today...</a:t>
+            </a:r>
+          </a:p>
+          <a:p>
+            <a:r>
+              <a:rPr lang="en-US" dirty="0"/>
+              <a:t>Final project:</a:t>
+            </a:r>
+          </a:p>
+          <a:p>
+            <a:pPr lvl="1"/>
+            <a:r>
+              <a:rPr lang="en-US" dirty="0"/>
+              <a:t>You should be working on this actively. First presentations are two weeks from last Monday!</a:t>
+            </a:r>
+          </a:p>
+          <a:p>
+            <a:r>
+              <a:rPr lang="en-US" dirty="0"/>
+              <a:t>We will have an attendance check today</a:t>
+            </a:r>
+          </a:p>
+          <a:p>
+            <a:r>
+              <a:rPr lang="en-US" dirty="0"/>
+              <a:t>Second quiz is next Friday!</a:t>
+            </a:r>
+          </a:p>
+          <a:p>
+            <a:r>
+              <a:rPr lang="en-US" dirty="0"/>
+              <a:t>Today we will finish Van </a:t>
+            </a:r>
+            <a:r>
+              <a:rPr lang="en-US" dirty="0" err="1"/>
+              <a:t>Emde</a:t>
+            </a:r>
+            <a:r>
+              <a:rPr lang="en-US" dirty="0"/>
+              <a:t> Boas and start Approximations</a:t>
+            </a:r>
+          </a:p>
+          <a:p>
+            <a:endParaRPr lang="en-US" dirty="0"/>
+          </a:p>
+        </p:txBody>
+      </p:sp>
+    </p:spTree>
+    <p:extLst>
+      <p:ext uri="{BB962C8B-B14F-4D97-AF65-F5344CB8AC3E}">
+        <p14:creationId xmlns:p14="http://schemas.microsoft.com/office/powerpoint/2010/main" val="2932047772"/>
+      </p:ext>
+    </p:extLst>
+  </p:cSld>
+  <p:clrMapOvr>
+    <a:masterClrMapping/>
+  </p:clrMapOvr>
+</p:sld>
+</file>
+
 <file path=ppt/slides/slide2.xml><?xml version="1.0" encoding="utf-8"?>
 <p:sld xmlns:a="http://schemas.openxmlformats.org/drawingml/2006/main" xmlns:r="http://schemas.openxmlformats.org/officeDocument/2006/relationships" xmlns:p="http://schemas.openxmlformats.org/presentationml/2006/main">
   <p:cSld>
@@ -15799,6 +15961,18 @@
 </file>
 
 <file path=ppt/tags/tag34.xml><?xml version="1.0" encoding="utf-8"?>
+<p:tagLst xmlns:a="http://schemas.openxmlformats.org/drawingml/2006/main" xmlns:r="http://schemas.openxmlformats.org/officeDocument/2006/relationships" xmlns:p="http://schemas.openxmlformats.org/presentationml/2006/main">
+  <p:tag name="_INSTRUCTOR VIEW19C14C36-AC8E-43BC-9DB6-C2AAF774C7DC|PANE__TAG" val="_"/>
+</p:tagLst>
+</file>
+
+<file path=ppt/tags/tag35.xml><?xml version="1.0" encoding="utf-8"?>
+<p:tagLst xmlns:a="http://schemas.openxmlformats.org/drawingml/2006/main" xmlns:r="http://schemas.openxmlformats.org/officeDocument/2006/relationships" xmlns:p="http://schemas.openxmlformats.org/presentationml/2006/main">
+  <p:tag name="_INSTRUCTOR VIEW19C14C36-AC8E-43BC-9DB6-C2AAF774C7DC|PANE__TAG" val="_"/>
+</p:tagLst>
+</file>
+
+<file path=ppt/tags/tag36.xml><?xml version="1.0" encoding="utf-8"?>
 <p:tagLst xmlns:a="http://schemas.openxmlformats.org/drawingml/2006/main" xmlns:r="http://schemas.openxmlformats.org/officeDocument/2006/relationships" xmlns:p="http://schemas.openxmlformats.org/presentationml/2006/main">
   <p:tag name="_INSTRUCTOR VIEW19C14C36-AC8E-43BC-9DB6-C2AAF774C7DC|PANE__TAG" val="_"/>
 </p:tagLst>

</xml_diff>